<commit_message>
aula 13 e 14
</commit_message>
<xml_diff>
--- a/content/aulas/13-primitivas_geometricas/aula13_primitivas_geometricas.pptx
+++ b/content/aulas/13-primitivas_geometricas/aula13_primitivas_geometricas.pptx
@@ -5,7 +5,7 @@
     <p:sldMasterId id="2147483651" r:id="rId1"/>
   </p:sldMasterIdLst>
   <p:notesMasterIdLst>
-    <p:notesMasterId r:id="rId12"/>
+    <p:notesMasterId r:id="rId13"/>
   </p:notesMasterIdLst>
   <p:sldIdLst>
     <p:sldId id="256" r:id="rId2"/>
@@ -15,19 +15,20 @@
     <p:sldId id="338" r:id="rId6"/>
     <p:sldId id="312" r:id="rId7"/>
     <p:sldId id="313" r:id="rId8"/>
-    <p:sldId id="319" r:id="rId9"/>
-    <p:sldId id="323" r:id="rId10"/>
-    <p:sldId id="314" r:id="rId11"/>
+    <p:sldId id="339" r:id="rId9"/>
+    <p:sldId id="319" r:id="rId10"/>
+    <p:sldId id="323" r:id="rId11"/>
+    <p:sldId id="314" r:id="rId12"/>
   </p:sldIdLst>
   <p:sldSz cx="9144000" cy="5715000" type="screen16x10"/>
   <p:notesSz cx="6858000" cy="9144000"/>
   <p:embeddedFontLst>
     <p:embeddedFont>
       <p:font typeface="Verdana" panose="020B0604030504040204" pitchFamily="34" charset="0"/>
-      <p:regular r:id="rId13"/>
-      <p:bold r:id="rId14"/>
-      <p:italic r:id="rId15"/>
-      <p:boldItalic r:id="rId16"/>
+      <p:regular r:id="rId14"/>
+      <p:bold r:id="rId15"/>
+      <p:italic r:id="rId16"/>
+      <p:boldItalic r:id="rId17"/>
     </p:embeddedFont>
   </p:embeddedFontLst>
   <p:defaultTextStyle>
@@ -2629,7 +2630,7 @@
             </a:pPr>
             <a:fld id="{00000000-1234-1234-1234-123412341234}" type="slidenum">
               <a:rPr lang="pt-BR"/>
-              <a:t>9</a:t>
+              <a:t>10</a:t>
             </a:fld>
             <a:endParaRPr/>
           </a:p>
@@ -6871,6 +6872,467 @@
   <p:cSld>
     <p:spTree>
       <p:nvGrpSpPr>
+        <p:cNvPr id="1" name="Shape 755"/>
+        <p:cNvGrpSpPr/>
+        <p:nvPr/>
+      </p:nvGrpSpPr>
+      <p:grpSpPr>
+        <a:xfrm>
+          <a:off x="0" y="0"/>
+          <a:ext cx="0" cy="0"/>
+          <a:chOff x="0" y="0"/>
+          <a:chExt cx="0" cy="0"/>
+        </a:xfrm>
+      </p:grpSpPr>
+      <p:sp>
+        <p:nvSpPr>
+          <p:cNvPr id="756" name="Google Shape;756;p74"/>
+          <p:cNvSpPr txBox="1">
+            <a:spLocks noGrp="1"/>
+          </p:cNvSpPr>
+          <p:nvPr>
+            <p:ph type="title"/>
+          </p:nvPr>
+        </p:nvSpPr>
+        <p:spPr>
+          <a:xfrm>
+            <a:off x="84172" y="113717"/>
+            <a:ext cx="8428200" cy="516000"/>
+          </a:xfrm>
+          <a:prstGeom prst="rect">
+            <a:avLst/>
+          </a:prstGeom>
+          <a:noFill/>
+          <a:ln>
+            <a:noFill/>
+          </a:ln>
+        </p:spPr>
+        <p:txBody>
+          <a:bodyPr spcFirstLastPara="1" wrap="square" lIns="91425" tIns="45700" rIns="91425" bIns="45700" anchor="t" anchorCtr="0">
+            <a:noAutofit/>
+          </a:bodyPr>
+          <a:lstStyle/>
+          <a:p>
+            <a:pPr marL="0" lvl="0" indent="0" algn="l" rtl="0">
+              <a:spcBef>
+                <a:spcPts val="0"/>
+              </a:spcBef>
+              <a:spcAft>
+                <a:spcPts val="0"/>
+              </a:spcAft>
+              <a:buClr>
+                <a:srgbClr val="C00026"/>
+              </a:buClr>
+              <a:buSzPts val="2600"/>
+              <a:buFont typeface="Verdana"/>
+              <a:buNone/>
+            </a:pPr>
+            <a:r>
+              <a:rPr lang="pt-BR" dirty="0"/>
+              <a:t>Quinta parte do projeto 1</a:t>
+            </a:r>
+            <a:endParaRPr dirty="0"/>
+          </a:p>
+        </p:txBody>
+      </p:sp>
+      <p:sp>
+        <p:nvSpPr>
+          <p:cNvPr id="757" name="Google Shape;757;p74"/>
+          <p:cNvSpPr txBox="1">
+            <a:spLocks noGrp="1"/>
+          </p:cNvSpPr>
+          <p:nvPr>
+            <p:ph type="sldNum" idx="12"/>
+          </p:nvPr>
+        </p:nvSpPr>
+        <p:spPr>
+          <a:xfrm>
+            <a:off x="0" y="5410729"/>
+            <a:ext cx="474900" cy="304200"/>
+          </a:xfrm>
+          <a:prstGeom prst="rect">
+            <a:avLst/>
+          </a:prstGeom>
+          <a:noFill/>
+          <a:ln>
+            <a:noFill/>
+          </a:ln>
+        </p:spPr>
+        <p:txBody>
+          <a:bodyPr spcFirstLastPara="1" wrap="square" lIns="91425" tIns="45700" rIns="91425" bIns="45700" anchor="ctr" anchorCtr="0">
+            <a:noAutofit/>
+          </a:bodyPr>
+          <a:lstStyle/>
+          <a:p>
+            <a:pPr marL="0" lvl="0" indent="0" algn="ctr" rtl="0">
+              <a:spcBef>
+                <a:spcPts val="0"/>
+              </a:spcBef>
+              <a:spcAft>
+                <a:spcPts val="0"/>
+              </a:spcAft>
+              <a:buClr>
+                <a:srgbClr val="000000"/>
+              </a:buClr>
+              <a:buFont typeface="Arial"/>
+              <a:buNone/>
+            </a:pPr>
+            <a:fld id="{00000000-1234-1234-1234-123412341234}" type="slidenum">
+              <a:rPr lang="pt-BR"/>
+              <a:t>10</a:t>
+            </a:fld>
+            <a:endParaRPr/>
+          </a:p>
+        </p:txBody>
+      </p:sp>
+      <p:sp>
+        <p:nvSpPr>
+          <p:cNvPr id="762" name="Google Shape;762;p74"/>
+          <p:cNvSpPr/>
+          <p:nvPr/>
+        </p:nvSpPr>
+        <p:spPr>
+          <a:xfrm>
+            <a:off x="1869618" y="2488188"/>
+            <a:ext cx="2162700" cy="369300"/>
+          </a:xfrm>
+          <a:prstGeom prst="rect">
+            <a:avLst/>
+          </a:prstGeom>
+          <a:noFill/>
+          <a:ln>
+            <a:noFill/>
+          </a:ln>
+        </p:spPr>
+        <p:txBody>
+          <a:bodyPr spcFirstLastPara="1" wrap="square" lIns="91425" tIns="45700" rIns="91425" bIns="45700" anchor="t" anchorCtr="0">
+            <a:noAutofit/>
+          </a:bodyPr>
+          <a:lstStyle/>
+          <a:p>
+            <a:pPr marL="0" marR="0" lvl="0" indent="0" algn="ctr" rtl="0">
+              <a:spcBef>
+                <a:spcPts val="0"/>
+              </a:spcBef>
+              <a:spcAft>
+                <a:spcPts val="0"/>
+              </a:spcAft>
+              <a:buNone/>
+            </a:pPr>
+            <a:r>
+              <a:rPr lang="pt-BR" sz="1600">
+                <a:solidFill>
+                  <a:schemeClr val="dk1"/>
+                </a:solidFill>
+              </a:rPr>
+              <a:t>textura</a:t>
+            </a:r>
+            <a:r>
+              <a:rPr lang="pt-BR" sz="1600">
+                <a:solidFill>
+                  <a:schemeClr val="dk1"/>
+                </a:solidFill>
+                <a:latin typeface="Arial"/>
+                <a:ea typeface="Arial"/>
+                <a:cs typeface="Arial"/>
+                <a:sym typeface="Arial"/>
+              </a:rPr>
+              <a:t>.x3d</a:t>
+            </a:r>
+            <a:endParaRPr sz="1200"/>
+          </a:p>
+        </p:txBody>
+      </p:sp>
+      <p:sp>
+        <p:nvSpPr>
+          <p:cNvPr id="763" name="Google Shape;763;p74"/>
+          <p:cNvSpPr/>
+          <p:nvPr/>
+        </p:nvSpPr>
+        <p:spPr>
+          <a:xfrm>
+            <a:off x="2565712" y="5115192"/>
+            <a:ext cx="4065600" cy="369300"/>
+          </a:xfrm>
+          <a:prstGeom prst="rect">
+            <a:avLst/>
+          </a:prstGeom>
+          <a:noFill/>
+          <a:ln>
+            <a:noFill/>
+          </a:ln>
+        </p:spPr>
+        <p:txBody>
+          <a:bodyPr spcFirstLastPara="1" wrap="square" lIns="91425" tIns="45700" rIns="91425" bIns="45700" anchor="t" anchorCtr="0">
+            <a:noAutofit/>
+          </a:bodyPr>
+          <a:lstStyle/>
+          <a:p>
+            <a:pPr marL="0" marR="0" lvl="0" indent="0" algn="l" rtl="0">
+              <a:spcBef>
+                <a:spcPts val="0"/>
+              </a:spcBef>
+              <a:spcAft>
+                <a:spcPts val="0"/>
+              </a:spcAft>
+              <a:buNone/>
+            </a:pPr>
+            <a:r>
+              <a:rPr lang="pt-BR" sz="1700" u="sng">
+                <a:solidFill>
+                  <a:schemeClr val="dk1"/>
+                </a:solidFill>
+                <a:latin typeface="Arial"/>
+                <a:ea typeface="Arial"/>
+                <a:cs typeface="Arial"/>
+                <a:sym typeface="Arial"/>
+                <a:hlinkClick r:id="rId3">
+                  <a:extLst>
+                    <a:ext uri="{A12FA001-AC4F-418D-AE19-62706E023703}">
+                      <ahyp:hlinkClr xmlns:ahyp="http://schemas.microsoft.com/office/drawing/2018/hyperlinkcolor" val="tx"/>
+                    </a:ext>
+                  </a:extLst>
+                </a:hlinkClick>
+              </a:rPr>
+              <a:t>https://lpsoares.github.io/Renderizador/</a:t>
+            </a:r>
+            <a:r>
+              <a:rPr lang="pt-BR" sz="1700">
+                <a:solidFill>
+                  <a:schemeClr val="dk1"/>
+                </a:solidFill>
+                <a:latin typeface="Arial"/>
+                <a:ea typeface="Arial"/>
+                <a:cs typeface="Arial"/>
+                <a:sym typeface="Arial"/>
+              </a:rPr>
+              <a:t> </a:t>
+            </a:r>
+            <a:endParaRPr sz="1300"/>
+          </a:p>
+        </p:txBody>
+      </p:sp>
+      <p:pic>
+        <p:nvPicPr>
+          <p:cNvPr id="768" name="Google Shape;768;p74"/>
+          <p:cNvPicPr preferRelativeResize="0"/>
+          <p:nvPr/>
+        </p:nvPicPr>
+        <p:blipFill>
+          <a:blip r:embed="rId4">
+            <a:alphaModFix/>
+          </a:blip>
+          <a:stretch>
+            <a:fillRect/>
+          </a:stretch>
+        </p:blipFill>
+        <p:spPr>
+          <a:xfrm>
+            <a:off x="1667930" y="1055787"/>
+            <a:ext cx="2566074" cy="1432700"/>
+          </a:xfrm>
+          <a:prstGeom prst="rect">
+            <a:avLst/>
+          </a:prstGeom>
+          <a:noFill/>
+          <a:ln>
+            <a:noFill/>
+          </a:ln>
+        </p:spPr>
+      </p:pic>
+      <p:sp>
+        <p:nvSpPr>
+          <p:cNvPr id="769" name="Google Shape;769;p74"/>
+          <p:cNvSpPr/>
+          <p:nvPr/>
+        </p:nvSpPr>
+        <p:spPr>
+          <a:xfrm>
+            <a:off x="4854856" y="2488200"/>
+            <a:ext cx="2136900" cy="369300"/>
+          </a:xfrm>
+          <a:prstGeom prst="rect">
+            <a:avLst/>
+          </a:prstGeom>
+          <a:noFill/>
+          <a:ln>
+            <a:noFill/>
+          </a:ln>
+        </p:spPr>
+        <p:txBody>
+          <a:bodyPr spcFirstLastPara="1" wrap="square" lIns="91425" tIns="45700" rIns="91425" bIns="45700" anchor="t" anchorCtr="0">
+            <a:noAutofit/>
+          </a:bodyPr>
+          <a:lstStyle/>
+          <a:p>
+            <a:pPr marL="0" marR="0" lvl="0" indent="0" algn="ctr" rtl="0">
+              <a:spcBef>
+                <a:spcPts val="0"/>
+              </a:spcBef>
+              <a:spcAft>
+                <a:spcPts val="0"/>
+              </a:spcAft>
+              <a:buNone/>
+            </a:pPr>
+            <a:r>
+              <a:rPr lang="pt-BR" sz="1600">
+                <a:solidFill>
+                  <a:schemeClr val="dk1"/>
+                </a:solidFill>
+              </a:rPr>
+              <a:t>texturas</a:t>
+            </a:r>
+            <a:r>
+              <a:rPr lang="pt-BR" sz="1600">
+                <a:solidFill>
+                  <a:schemeClr val="dk1"/>
+                </a:solidFill>
+                <a:latin typeface="Arial"/>
+                <a:ea typeface="Arial"/>
+                <a:cs typeface="Arial"/>
+                <a:sym typeface="Arial"/>
+              </a:rPr>
+              <a:t>.x3d</a:t>
+            </a:r>
+            <a:endParaRPr sz="1200"/>
+          </a:p>
+        </p:txBody>
+      </p:sp>
+      <p:pic>
+        <p:nvPicPr>
+          <p:cNvPr id="770" name="Google Shape;770;p74"/>
+          <p:cNvPicPr preferRelativeResize="0"/>
+          <p:nvPr/>
+        </p:nvPicPr>
+        <p:blipFill>
+          <a:blip r:embed="rId5">
+            <a:alphaModFix/>
+          </a:blip>
+          <a:stretch>
+            <a:fillRect/>
+          </a:stretch>
+        </p:blipFill>
+        <p:spPr>
+          <a:xfrm>
+            <a:off x="4827706" y="1036088"/>
+            <a:ext cx="2163994" cy="1442663"/>
+          </a:xfrm>
+          <a:prstGeom prst="rect">
+            <a:avLst/>
+          </a:prstGeom>
+          <a:noFill/>
+          <a:ln>
+            <a:noFill/>
+          </a:ln>
+        </p:spPr>
+      </p:pic>
+      <p:sp>
+        <p:nvSpPr>
+          <p:cNvPr id="2" name="Google Shape;762;p74">
+            <a:extLst>
+              <a:ext uri="{FF2B5EF4-FFF2-40B4-BE49-F238E27FC236}">
+                <a16:creationId xmlns:a16="http://schemas.microsoft.com/office/drawing/2014/main" id="{89100981-2626-FB6D-F6EB-BF66AD56F810}"/>
+              </a:ext>
+            </a:extLst>
+          </p:cNvPr>
+          <p:cNvSpPr/>
+          <p:nvPr/>
+        </p:nvSpPr>
+        <p:spPr>
+          <a:xfrm>
+            <a:off x="3490650" y="4474563"/>
+            <a:ext cx="2162700" cy="369300"/>
+          </a:xfrm>
+          <a:prstGeom prst="rect">
+            <a:avLst/>
+          </a:prstGeom>
+          <a:noFill/>
+          <a:ln>
+            <a:noFill/>
+          </a:ln>
+        </p:spPr>
+        <p:txBody>
+          <a:bodyPr spcFirstLastPara="1" wrap="square" lIns="91425" tIns="45700" rIns="91425" bIns="45700" anchor="t" anchorCtr="0">
+            <a:noAutofit/>
+          </a:bodyPr>
+          <a:lstStyle/>
+          <a:p>
+            <a:pPr marL="0" marR="0" lvl="0" indent="0" algn="ctr" rtl="0">
+              <a:spcBef>
+                <a:spcPts val="0"/>
+              </a:spcBef>
+              <a:spcAft>
+                <a:spcPts val="0"/>
+              </a:spcAft>
+              <a:buNone/>
+            </a:pPr>
+            <a:r>
+              <a:rPr lang="pt-BR" sz="1600" dirty="0">
+                <a:solidFill>
+                  <a:schemeClr val="dk1"/>
+                </a:solidFill>
+              </a:rPr>
+              <a:t>primitivas</a:t>
+            </a:r>
+            <a:r>
+              <a:rPr lang="pt-BR" sz="1600" dirty="0">
+                <a:solidFill>
+                  <a:schemeClr val="dk1"/>
+                </a:solidFill>
+                <a:latin typeface="Arial"/>
+                <a:ea typeface="Arial"/>
+                <a:cs typeface="Arial"/>
+                <a:sym typeface="Arial"/>
+              </a:rPr>
+              <a:t>.x3d</a:t>
+            </a:r>
+            <a:endParaRPr sz="1200" dirty="0"/>
+          </a:p>
+        </p:txBody>
+      </p:sp>
+      <p:pic>
+        <p:nvPicPr>
+          <p:cNvPr id="4" name="Picture 3" descr="A picture containing screen&#10;&#10;Description automatically generated">
+            <a:extLst>
+              <a:ext uri="{FF2B5EF4-FFF2-40B4-BE49-F238E27FC236}">
+                <a16:creationId xmlns:a16="http://schemas.microsoft.com/office/drawing/2014/main" id="{7F4B1189-28DC-2328-6546-D796DC12577A}"/>
+              </a:ext>
+            </a:extLst>
+          </p:cNvPr>
+          <p:cNvPicPr>
+            <a:picLocks noChangeAspect="1"/>
+          </p:cNvPicPr>
+          <p:nvPr/>
+        </p:nvPicPr>
+        <p:blipFill>
+          <a:blip r:embed="rId6"/>
+          <a:stretch>
+            <a:fillRect/>
+          </a:stretch>
+        </p:blipFill>
+        <p:spPr>
+          <a:xfrm>
+            <a:off x="3291303" y="3022164"/>
+            <a:ext cx="2561394" cy="1442663"/>
+          </a:xfrm>
+          <a:prstGeom prst="rect">
+            <a:avLst/>
+          </a:prstGeom>
+        </p:spPr>
+      </p:pic>
+    </p:spTree>
+  </p:cSld>
+  <p:clrMapOvr>
+    <a:masterClrMapping/>
+  </p:clrMapOvr>
+</p:sld>
+</file>
+
+<file path=ppt/slides/slide11.xml><?xml version="1.0" encoding="utf-8"?>
+<p:sld xmlns:a="http://schemas.openxmlformats.org/drawingml/2006/main" xmlns:r="http://schemas.openxmlformats.org/officeDocument/2006/relationships" xmlns:p="http://schemas.openxmlformats.org/presentationml/2006/main">
+  <p:cSld>
+    <p:spTree>
+      <p:nvGrpSpPr>
         <p:cNvPr id="1" name="Shape 741"/>
         <p:cNvGrpSpPr/>
         <p:nvPr/>
@@ -6927,7 +7389,7 @@
             </a:pPr>
             <a:fld id="{00000000-1234-1234-1234-123412341234}" type="slidenum">
               <a:rPr lang="pt-BR"/>
-              <a:t>10</a:t>
+              <a:t>11</a:t>
             </a:fld>
             <a:endParaRPr/>
           </a:p>
@@ -8530,6 +8992,470 @@
   <p:cSld>
     <p:spTree>
       <p:nvGrpSpPr>
+        <p:cNvPr id="1" name=""/>
+        <p:cNvGrpSpPr/>
+        <p:nvPr/>
+      </p:nvGrpSpPr>
+      <p:grpSpPr>
+        <a:xfrm>
+          <a:off x="0" y="0"/>
+          <a:ext cx="0" cy="0"/>
+          <a:chOff x="0" y="0"/>
+          <a:chExt cx="0" cy="0"/>
+        </a:xfrm>
+      </p:grpSpPr>
+      <p:sp>
+        <p:nvSpPr>
+          <p:cNvPr id="2" name="Title 1">
+            <a:extLst>
+              <a:ext uri="{FF2B5EF4-FFF2-40B4-BE49-F238E27FC236}">
+                <a16:creationId xmlns:a16="http://schemas.microsoft.com/office/drawing/2014/main" id="{549CE190-4A7E-1C13-F0E5-60AF3D062CB4}"/>
+              </a:ext>
+            </a:extLst>
+          </p:cNvPr>
+          <p:cNvSpPr>
+            <a:spLocks noGrp="1"/>
+          </p:cNvSpPr>
+          <p:nvPr>
+            <p:ph type="title"/>
+          </p:nvPr>
+        </p:nvSpPr>
+        <p:spPr/>
+        <p:txBody>
+          <a:bodyPr/>
+          <a:lstStyle/>
+          <a:p>
+            <a:r>
+              <a:rPr lang="pt-BR" dirty="0"/>
+              <a:t>Mais malhas de esferas</a:t>
+            </a:r>
+          </a:p>
+        </p:txBody>
+      </p:sp>
+      <p:sp>
+        <p:nvSpPr>
+          <p:cNvPr id="3" name="Text Placeholder 2">
+            <a:extLst>
+              <a:ext uri="{FF2B5EF4-FFF2-40B4-BE49-F238E27FC236}">
+                <a16:creationId xmlns:a16="http://schemas.microsoft.com/office/drawing/2014/main" id="{2935BCD4-04CD-D5C8-5EF0-2673FA9785E9}"/>
+              </a:ext>
+            </a:extLst>
+          </p:cNvPr>
+          <p:cNvSpPr>
+            <a:spLocks noGrp="1"/>
+          </p:cNvSpPr>
+          <p:nvPr>
+            <p:ph type="body" idx="1"/>
+          </p:nvPr>
+        </p:nvSpPr>
+        <p:spPr>
+          <a:xfrm>
+            <a:off x="237506" y="760974"/>
+            <a:ext cx="3529822" cy="4496159"/>
+          </a:xfrm>
+        </p:spPr>
+        <p:txBody>
+          <a:bodyPr>
+            <a:noAutofit/>
+          </a:bodyPr>
+          <a:lstStyle/>
+          <a:p>
+            <a:pPr marL="180975" indent="-173038" algn="r">
+              <a:buFont typeface="Arial" panose="020B0604020202020204" pitchFamily="34" charset="0"/>
+              <a:buChar char="•"/>
+            </a:pPr>
+            <a:r>
+              <a:rPr lang="pt-BR" sz="2350" dirty="0"/>
+              <a:t>UV </a:t>
+            </a:r>
+            <a:r>
+              <a:rPr lang="pt-BR" sz="2350" dirty="0" err="1"/>
+              <a:t>sphere</a:t>
+            </a:r>
+            <a:endParaRPr lang="pt-BR" sz="2350" dirty="0"/>
+          </a:p>
+          <a:p>
+            <a:pPr marL="180975" indent="-173038" algn="r">
+              <a:buFont typeface="Arial" panose="020B0604020202020204" pitchFamily="34" charset="0"/>
+              <a:buChar char="•"/>
+            </a:pPr>
+            <a:endParaRPr lang="pt-BR" sz="2350" dirty="0"/>
+          </a:p>
+          <a:p>
+            <a:pPr marL="180975" indent="-173038" algn="r">
+              <a:buFont typeface="Arial" panose="020B0604020202020204" pitchFamily="34" charset="0"/>
+              <a:buChar char="•"/>
+            </a:pPr>
+            <a:endParaRPr lang="pt-BR" sz="2350" dirty="0"/>
+          </a:p>
+          <a:p>
+            <a:pPr marL="180975" indent="-173038" algn="r">
+              <a:buFont typeface="Arial" panose="020B0604020202020204" pitchFamily="34" charset="0"/>
+              <a:buChar char="•"/>
+            </a:pPr>
+            <a:r>
+              <a:rPr lang="pt-BR" sz="2350" dirty="0" err="1"/>
+              <a:t>Icosphere</a:t>
+            </a:r>
+            <a:endParaRPr lang="pt-BR" sz="2350" dirty="0"/>
+          </a:p>
+          <a:p>
+            <a:pPr marL="180975" indent="-173038" algn="r">
+              <a:buFont typeface="Arial" panose="020B0604020202020204" pitchFamily="34" charset="0"/>
+              <a:buChar char="•"/>
+            </a:pPr>
+            <a:endParaRPr lang="pt-BR" sz="2350" dirty="0"/>
+          </a:p>
+          <a:p>
+            <a:pPr marL="180975" indent="-173038" algn="r">
+              <a:buFont typeface="Arial" panose="020B0604020202020204" pitchFamily="34" charset="0"/>
+              <a:buChar char="•"/>
+            </a:pPr>
+            <a:endParaRPr lang="pt-BR" sz="2350" dirty="0"/>
+          </a:p>
+          <a:p>
+            <a:pPr marL="180975" indent="-173038" algn="r">
+              <a:buFont typeface="Arial" panose="020B0604020202020204" pitchFamily="34" charset="0"/>
+              <a:buChar char="•"/>
+            </a:pPr>
+            <a:r>
+              <a:rPr lang="pt-BR" sz="2350" dirty="0" err="1"/>
+              <a:t>Quad</a:t>
+            </a:r>
+            <a:r>
+              <a:rPr lang="pt-BR" sz="2350" dirty="0"/>
+              <a:t> </a:t>
+            </a:r>
+            <a:r>
+              <a:rPr lang="pt-BR" sz="2350" dirty="0" err="1"/>
+              <a:t>sphere</a:t>
+            </a:r>
+            <a:endParaRPr lang="pt-BR" sz="2350" dirty="0"/>
+          </a:p>
+          <a:p>
+            <a:pPr marL="180975" indent="-173038" algn="r">
+              <a:buFont typeface="Arial" panose="020B0604020202020204" pitchFamily="34" charset="0"/>
+              <a:buChar char="•"/>
+            </a:pPr>
+            <a:endParaRPr lang="pt-BR" sz="2350" dirty="0"/>
+          </a:p>
+          <a:p>
+            <a:pPr marL="180975" indent="-173038" algn="r">
+              <a:buFont typeface="Arial" panose="020B0604020202020204" pitchFamily="34" charset="0"/>
+              <a:buChar char="•"/>
+            </a:pPr>
+            <a:endParaRPr lang="pt-BR" sz="2350" dirty="0"/>
+          </a:p>
+          <a:p>
+            <a:pPr marL="180975" indent="-173038" algn="r">
+              <a:buFont typeface="Arial" panose="020B0604020202020204" pitchFamily="34" charset="0"/>
+              <a:buChar char="•"/>
+            </a:pPr>
+            <a:r>
+              <a:rPr lang="pt-BR" sz="2350" dirty="0"/>
+              <a:t>Goldberg </a:t>
+            </a:r>
+            <a:r>
+              <a:rPr lang="pt-BR" sz="2350" dirty="0" err="1"/>
+              <a:t>polyhedra</a:t>
+            </a:r>
+            <a:endParaRPr lang="pt-BR" sz="2350" dirty="0"/>
+          </a:p>
+        </p:txBody>
+      </p:sp>
+      <p:sp>
+        <p:nvSpPr>
+          <p:cNvPr id="4" name="Slide Number Placeholder 3">
+            <a:extLst>
+              <a:ext uri="{FF2B5EF4-FFF2-40B4-BE49-F238E27FC236}">
+                <a16:creationId xmlns:a16="http://schemas.microsoft.com/office/drawing/2014/main" id="{87FD6916-5CFE-C24C-B6ED-3A7F39C2DF77}"/>
+              </a:ext>
+            </a:extLst>
+          </p:cNvPr>
+          <p:cNvSpPr>
+            <a:spLocks noGrp="1"/>
+          </p:cNvSpPr>
+          <p:nvPr>
+            <p:ph type="sldNum" idx="12"/>
+          </p:nvPr>
+        </p:nvSpPr>
+        <p:spPr/>
+        <p:txBody>
+          <a:bodyPr/>
+          <a:lstStyle/>
+          <a:p>
+            <a:pPr marL="0" lvl="0" indent="0" algn="ctr" rtl="0">
+              <a:spcBef>
+                <a:spcPts val="0"/>
+              </a:spcBef>
+              <a:spcAft>
+                <a:spcPts val="0"/>
+              </a:spcAft>
+              <a:buNone/>
+            </a:pPr>
+            <a:fld id="{00000000-1234-1234-1234-123412341234}" type="slidenum">
+              <a:rPr lang="pt-BR" smtClean="0"/>
+              <a:t>8</a:t>
+            </a:fld>
+            <a:endParaRPr lang="pt-BR"/>
+          </a:p>
+        </p:txBody>
+      </p:sp>
+      <p:sp>
+        <p:nvSpPr>
+          <p:cNvPr id="6" name="TextBox 5">
+            <a:extLst>
+              <a:ext uri="{FF2B5EF4-FFF2-40B4-BE49-F238E27FC236}">
+                <a16:creationId xmlns:a16="http://schemas.microsoft.com/office/drawing/2014/main" id="{43E6A0AB-9881-52A0-C1AC-B5CC4F21AD4C}"/>
+              </a:ext>
+            </a:extLst>
+          </p:cNvPr>
+          <p:cNvSpPr txBox="1"/>
+          <p:nvPr/>
+        </p:nvSpPr>
+        <p:spPr>
+          <a:xfrm>
+            <a:off x="1789938" y="5388452"/>
+            <a:ext cx="6488026" cy="276999"/>
+          </a:xfrm>
+          <a:prstGeom prst="rect">
+            <a:avLst/>
+          </a:prstGeom>
+          <a:noFill/>
+        </p:spPr>
+        <p:txBody>
+          <a:bodyPr wrap="square">
+            <a:spAutoFit/>
+          </a:bodyPr>
+          <a:lstStyle/>
+          <a:p>
+            <a:pPr algn="r"/>
+            <a:r>
+              <a:rPr lang="pt-BR" sz="1200" dirty="0"/>
+              <a:t>https://</a:t>
+            </a:r>
+            <a:r>
+              <a:rPr lang="pt-BR" sz="1200" dirty="0" err="1"/>
+              <a:t>www.danielsieger.com</a:t>
+            </a:r>
+            <a:r>
+              <a:rPr lang="pt-BR" sz="1200" dirty="0"/>
+              <a:t>/blog/2021/03/27/</a:t>
+            </a:r>
+            <a:r>
+              <a:rPr lang="pt-BR" sz="1200" dirty="0" err="1"/>
+              <a:t>generating-spheres.html</a:t>
+            </a:r>
+            <a:endParaRPr lang="pt-BR" sz="1200" dirty="0"/>
+          </a:p>
+        </p:txBody>
+      </p:sp>
+      <p:pic>
+        <p:nvPicPr>
+          <p:cNvPr id="1026" name="Picture 2" descr="Different refinement levels of the UV sphere">
+            <a:extLst>
+              <a:ext uri="{FF2B5EF4-FFF2-40B4-BE49-F238E27FC236}">
+                <a16:creationId xmlns:a16="http://schemas.microsoft.com/office/drawing/2014/main" id="{A42A3408-97F9-614D-3091-6B3307E9D914}"/>
+              </a:ext>
+            </a:extLst>
+          </p:cNvPr>
+          <p:cNvPicPr>
+            <a:picLocks noChangeAspect="1" noChangeArrowheads="1"/>
+          </p:cNvPicPr>
+          <p:nvPr/>
+        </p:nvPicPr>
+        <p:blipFill>
+          <a:blip r:embed="rId2">
+            <a:extLst>
+              <a:ext uri="{28A0092B-C50C-407E-A947-70E740481C1C}">
+                <a14:useLocalDpi xmlns:a14="http://schemas.microsoft.com/office/drawing/2010/main" val="0"/>
+              </a:ext>
+            </a:extLst>
+          </a:blip>
+          <a:srcRect/>
+          <a:stretch>
+            <a:fillRect/>
+          </a:stretch>
+        </p:blipFill>
+        <p:spPr bwMode="auto">
+          <a:xfrm>
+            <a:off x="3844292" y="660462"/>
+            <a:ext cx="3795266" cy="969901"/>
+          </a:xfrm>
+          <a:prstGeom prst="rect">
+            <a:avLst/>
+          </a:prstGeom>
+          <a:noFill/>
+          <a:extLst>
+            <a:ext uri="{909E8E84-426E-40DD-AFC4-6F175D3DCCD1}">
+              <a14:hiddenFill xmlns:a14="http://schemas.microsoft.com/office/drawing/2010/main">
+                <a:solidFill>
+                  <a:srgbClr val="FFFFFF"/>
+                </a:solidFill>
+              </a14:hiddenFill>
+            </a:ext>
+          </a:extLst>
+        </p:spPr>
+      </p:pic>
+      <p:pic>
+        <p:nvPicPr>
+          <p:cNvPr id="1028" name="Picture 4" descr="Different refinement levels of the icosphere">
+            <a:extLst>
+              <a:ext uri="{FF2B5EF4-FFF2-40B4-BE49-F238E27FC236}">
+                <a16:creationId xmlns:a16="http://schemas.microsoft.com/office/drawing/2014/main" id="{1D9E5F73-E751-B5A1-21DD-F1866159CC93}"/>
+              </a:ext>
+            </a:extLst>
+          </p:cNvPr>
+          <p:cNvPicPr>
+            <a:picLocks noChangeAspect="1" noChangeArrowheads="1"/>
+          </p:cNvPicPr>
+          <p:nvPr/>
+        </p:nvPicPr>
+        <p:blipFill>
+          <a:blip r:embed="rId3">
+            <a:extLst>
+              <a:ext uri="{28A0092B-C50C-407E-A947-70E740481C1C}">
+                <a14:useLocalDpi xmlns:a14="http://schemas.microsoft.com/office/drawing/2010/main" val="0"/>
+              </a:ext>
+            </a:extLst>
+          </a:blip>
+          <a:srcRect/>
+          <a:stretch>
+            <a:fillRect/>
+          </a:stretch>
+        </p:blipFill>
+        <p:spPr bwMode="auto">
+          <a:xfrm>
+            <a:off x="3844293" y="1878390"/>
+            <a:ext cx="3795266" cy="919167"/>
+          </a:xfrm>
+          <a:prstGeom prst="rect">
+            <a:avLst/>
+          </a:prstGeom>
+          <a:noFill/>
+          <a:extLst>
+            <a:ext uri="{909E8E84-426E-40DD-AFC4-6F175D3DCCD1}">
+              <a14:hiddenFill xmlns:a14="http://schemas.microsoft.com/office/drawing/2010/main">
+                <a:solidFill>
+                  <a:srgbClr val="FFFFFF"/>
+                </a:solidFill>
+              </a14:hiddenFill>
+            </a:ext>
+          </a:extLst>
+        </p:spPr>
+      </p:pic>
+      <p:pic>
+        <p:nvPicPr>
+          <p:cNvPr id="1030" name="Picture 6" descr="Different refinement levels of the quad sphere">
+            <a:extLst>
+              <a:ext uri="{FF2B5EF4-FFF2-40B4-BE49-F238E27FC236}">
+                <a16:creationId xmlns:a16="http://schemas.microsoft.com/office/drawing/2014/main" id="{C80C88E9-8D43-86A0-F4C8-55FDAC52FC84}"/>
+              </a:ext>
+            </a:extLst>
+          </p:cNvPr>
+          <p:cNvPicPr>
+            <a:picLocks noChangeAspect="1" noChangeArrowheads="1"/>
+          </p:cNvPicPr>
+          <p:nvPr/>
+        </p:nvPicPr>
+        <p:blipFill>
+          <a:blip r:embed="rId4">
+            <a:extLst>
+              <a:ext uri="{28A0092B-C50C-407E-A947-70E740481C1C}">
+                <a14:useLocalDpi xmlns:a14="http://schemas.microsoft.com/office/drawing/2010/main" val="0"/>
+              </a:ext>
+            </a:extLst>
+          </a:blip>
+          <a:srcRect/>
+          <a:stretch>
+            <a:fillRect/>
+          </a:stretch>
+        </p:blipFill>
+        <p:spPr bwMode="auto">
+          <a:xfrm>
+            <a:off x="3844292" y="3045583"/>
+            <a:ext cx="3795265" cy="981761"/>
+          </a:xfrm>
+          <a:prstGeom prst="rect">
+            <a:avLst/>
+          </a:prstGeom>
+          <a:noFill/>
+          <a:extLst>
+            <a:ext uri="{909E8E84-426E-40DD-AFC4-6F175D3DCCD1}">
+              <a14:hiddenFill xmlns:a14="http://schemas.microsoft.com/office/drawing/2010/main">
+                <a:solidFill>
+                  <a:srgbClr val="FFFFFF"/>
+                </a:solidFill>
+              </a14:hiddenFill>
+            </a:ext>
+          </a:extLst>
+        </p:spPr>
+      </p:pic>
+      <p:pic>
+        <p:nvPicPr>
+          <p:cNvPr id="1032" name="Picture 8" descr="Different Goldberg polyhedra">
+            <a:extLst>
+              <a:ext uri="{FF2B5EF4-FFF2-40B4-BE49-F238E27FC236}">
+                <a16:creationId xmlns:a16="http://schemas.microsoft.com/office/drawing/2014/main" id="{D7D4179A-28B9-7562-14FA-4D018A5FA08F}"/>
+              </a:ext>
+            </a:extLst>
+          </p:cNvPr>
+          <p:cNvPicPr>
+            <a:picLocks noChangeAspect="1" noChangeArrowheads="1"/>
+          </p:cNvPicPr>
+          <p:nvPr/>
+        </p:nvPicPr>
+        <p:blipFill>
+          <a:blip r:embed="rId5">
+            <a:extLst>
+              <a:ext uri="{28A0092B-C50C-407E-A947-70E740481C1C}">
+                <a14:useLocalDpi xmlns:a14="http://schemas.microsoft.com/office/drawing/2010/main" val="0"/>
+              </a:ext>
+            </a:extLst>
+          </a:blip>
+          <a:srcRect/>
+          <a:stretch>
+            <a:fillRect/>
+          </a:stretch>
+        </p:blipFill>
+        <p:spPr bwMode="auto">
+          <a:xfrm>
+            <a:off x="3844293" y="4275371"/>
+            <a:ext cx="3795264" cy="1008117"/>
+          </a:xfrm>
+          <a:prstGeom prst="rect">
+            <a:avLst/>
+          </a:prstGeom>
+          <a:noFill/>
+          <a:extLst>
+            <a:ext uri="{909E8E84-426E-40DD-AFC4-6F175D3DCCD1}">
+              <a14:hiddenFill xmlns:a14="http://schemas.microsoft.com/office/drawing/2010/main">
+                <a:solidFill>
+                  <a:srgbClr val="FFFFFF"/>
+                </a:solidFill>
+              </a14:hiddenFill>
+            </a:ext>
+          </a:extLst>
+        </p:spPr>
+      </p:pic>
+    </p:spTree>
+    <p:extLst>
+      <p:ext uri="{BB962C8B-B14F-4D97-AF65-F5344CB8AC3E}">
+        <p14:creationId xmlns:p14="http://schemas.microsoft.com/office/powerpoint/2010/main" val="2588734044"/>
+      </p:ext>
+    </p:extLst>
+  </p:cSld>
+  <p:clrMapOvr>
+    <a:masterClrMapping/>
+  </p:clrMapOvr>
+</p:sld>
+</file>
+
+<file path=ppt/slides/slide9.xml><?xml version="1.0" encoding="utf-8"?>
+<p:sld xmlns:a="http://schemas.openxmlformats.org/drawingml/2006/main" xmlns:r="http://schemas.openxmlformats.org/officeDocument/2006/relationships" xmlns:p="http://schemas.openxmlformats.org/presentationml/2006/main">
+  <p:cSld>
+    <p:spTree>
+      <p:nvGrpSpPr>
         <p:cNvPr id="1" name="Shape 474"/>
         <p:cNvGrpSpPr/>
         <p:nvPr/>
@@ -8605,8 +9531,8 @@
         </p:nvSpPr>
         <p:spPr>
           <a:xfrm>
-            <a:off x="300875" y="1124700"/>
-            <a:ext cx="4664100" cy="3465600"/>
+            <a:off x="221332" y="1124700"/>
+            <a:ext cx="4350668" cy="3465600"/>
           </a:xfrm>
           <a:prstGeom prst="rect">
             <a:avLst/>
@@ -8636,10 +9562,10 @@
               <a:buNone/>
             </a:pPr>
             <a:r>
-              <a:rPr lang="pt-BR" sz="1167"/>
+              <a:rPr lang="pt-BR" sz="1000" b="1" dirty="0"/>
               <a:t>Box : X3DGeometryNode { </a:t>
             </a:r>
-            <a:endParaRPr/>
+            <a:endParaRPr sz="1000" b="1" dirty="0"/>
           </a:p>
           <a:p>
             <a:pPr marL="0" lvl="0" indent="0" algn="l" rtl="0">
@@ -8656,10 +9582,34 @@
               <a:buNone/>
             </a:pPr>
             <a:r>
-              <a:rPr lang="pt-BR" sz="1167"/>
-              <a:t>  SFNode  [in,out] metadata NULL  [X3DMetadataObject]</a:t>
-            </a:r>
-            <a:endParaRPr/>
+              <a:rPr lang="pt-BR" sz="1000" b="1" dirty="0"/>
+              <a:t>  </a:t>
+            </a:r>
+            <a:r>
+              <a:rPr lang="pt-BR" sz="1000" b="1" dirty="0" err="1"/>
+              <a:t>SFNode</a:t>
+            </a:r>
+            <a:r>
+              <a:rPr lang="pt-BR" sz="1000" b="1" dirty="0"/>
+              <a:t>  [</a:t>
+            </a:r>
+            <a:r>
+              <a:rPr lang="pt-BR" sz="1000" b="1" dirty="0" err="1"/>
+              <a:t>in,out</a:t>
+            </a:r>
+            <a:r>
+              <a:rPr lang="pt-BR" sz="1000" b="1" dirty="0"/>
+              <a:t>] </a:t>
+            </a:r>
+            <a:r>
+              <a:rPr lang="pt-BR" sz="1000" b="1" dirty="0" err="1"/>
+              <a:t>metadata</a:t>
+            </a:r>
+            <a:r>
+              <a:rPr lang="pt-BR" sz="1000" b="1" dirty="0"/>
+              <a:t> NULL  [X3DMetadataObject]</a:t>
+            </a:r>
+            <a:endParaRPr sz="1000" b="1" dirty="0"/>
           </a:p>
           <a:p>
             <a:pPr marL="0" lvl="0" indent="0" algn="l" rtl="0">
@@ -8676,10 +9626,18 @@
               <a:buNone/>
             </a:pPr>
             <a:r>
-              <a:rPr lang="pt-BR" sz="1167"/>
-              <a:t>  SFVec3f []       size     2 2 2 (0,∞)</a:t>
-            </a:r>
-            <a:endParaRPr/>
+              <a:rPr lang="pt-BR" sz="1000" b="1" dirty="0"/>
+              <a:t>  SFVec3f []       </a:t>
+            </a:r>
+            <a:r>
+              <a:rPr lang="pt-BR" sz="1000" b="1" dirty="0" err="1"/>
+              <a:t>size</a:t>
+            </a:r>
+            <a:r>
+              <a:rPr lang="pt-BR" sz="1000" b="1" dirty="0"/>
+              <a:t>     2 2 2 (0,∞)</a:t>
+            </a:r>
+            <a:endParaRPr sz="1000" b="1" dirty="0"/>
           </a:p>
           <a:p>
             <a:pPr marL="0" lvl="0" indent="0" algn="l" rtl="0">
@@ -8696,10 +9654,26 @@
               <a:buNone/>
             </a:pPr>
             <a:r>
-              <a:rPr lang="pt-BR" sz="1167"/>
-              <a:t>  SFBool  []       solid    TRUE</a:t>
-            </a:r>
-            <a:endParaRPr/>
+              <a:rPr lang="pt-BR" sz="1000" b="1" dirty="0"/>
+              <a:t>  </a:t>
+            </a:r>
+            <a:r>
+              <a:rPr lang="pt-BR" sz="1000" b="1" dirty="0" err="1"/>
+              <a:t>SFBool</a:t>
+            </a:r>
+            <a:r>
+              <a:rPr lang="pt-BR" sz="1000" b="1" dirty="0"/>
+              <a:t>  []       </a:t>
+            </a:r>
+            <a:r>
+              <a:rPr lang="pt-BR" sz="1000" b="1" dirty="0" err="1"/>
+              <a:t>solid</a:t>
+            </a:r>
+            <a:r>
+              <a:rPr lang="pt-BR" sz="1000" b="1" dirty="0"/>
+              <a:t>    TRUE</a:t>
+            </a:r>
+            <a:endParaRPr sz="1000" b="1" dirty="0"/>
           </a:p>
           <a:p>
             <a:pPr marL="0" lvl="0" indent="0" algn="l" rtl="0">
@@ -8716,10 +9690,10 @@
               <a:buNone/>
             </a:pPr>
             <a:r>
-              <a:rPr lang="pt-BR" sz="1167"/>
+              <a:rPr lang="pt-BR" sz="1000" b="1" dirty="0"/>
               <a:t>}</a:t>
             </a:r>
-            <a:endParaRPr/>
+            <a:endParaRPr sz="1000" b="1" dirty="0"/>
           </a:p>
           <a:p>
             <a:pPr marL="0" lvl="0" indent="0" algn="l" rtl="0">
@@ -8735,7 +9709,7 @@
               <a:buSzPts val="1167"/>
               <a:buNone/>
             </a:pPr>
-            <a:endParaRPr sz="1167"/>
+            <a:endParaRPr sz="1000" dirty="0"/>
           </a:p>
           <a:p>
             <a:pPr marL="0" lvl="0" indent="0" algn="l" rtl="0">
@@ -8751,7 +9725,7 @@
               <a:buSzPts val="1167"/>
               <a:buNone/>
             </a:pPr>
-            <a:endParaRPr sz="1167"/>
+            <a:endParaRPr sz="1000" dirty="0"/>
           </a:p>
           <a:p>
             <a:pPr marL="0" lvl="0" indent="0" algn="l" rtl="0">
@@ -8768,10 +9742,14 @@
               <a:buNone/>
             </a:pPr>
             <a:r>
-              <a:rPr lang="pt-BR" sz="1167"/>
-              <a:t>Cylinder : X3DGeometryNode { </a:t>
-            </a:r>
-            <a:endParaRPr/>
+              <a:rPr lang="pt-BR" sz="1000" dirty="0" err="1"/>
+              <a:t>Cylinder</a:t>
+            </a:r>
+            <a:r>
+              <a:rPr lang="pt-BR" sz="1000" dirty="0"/>
+              <a:t> : X3DGeometryNode { </a:t>
+            </a:r>
+            <a:endParaRPr sz="1000" dirty="0"/>
           </a:p>
           <a:p>
             <a:pPr marL="0" lvl="0" indent="0" algn="l" rtl="0">
@@ -8788,10 +9766,34 @@
               <a:buNone/>
             </a:pPr>
             <a:r>
-              <a:rPr lang="pt-BR" sz="1167"/>
-              <a:t>  SFNode  [in,out] metadata NULL [X3DMetadataObject]</a:t>
-            </a:r>
-            <a:endParaRPr/>
+              <a:rPr lang="pt-BR" sz="1000" dirty="0"/>
+              <a:t>  </a:t>
+            </a:r>
+            <a:r>
+              <a:rPr lang="pt-BR" sz="1000" dirty="0" err="1"/>
+              <a:t>SFNode</a:t>
+            </a:r>
+            <a:r>
+              <a:rPr lang="pt-BR" sz="1000" dirty="0"/>
+              <a:t>  [</a:t>
+            </a:r>
+            <a:r>
+              <a:rPr lang="pt-BR" sz="1000" dirty="0" err="1"/>
+              <a:t>in,out</a:t>
+            </a:r>
+            <a:r>
+              <a:rPr lang="pt-BR" sz="1000" dirty="0"/>
+              <a:t>] </a:t>
+            </a:r>
+            <a:r>
+              <a:rPr lang="pt-BR" sz="1000" dirty="0" err="1"/>
+              <a:t>metadata</a:t>
+            </a:r>
+            <a:r>
+              <a:rPr lang="pt-BR" sz="1000" dirty="0"/>
+              <a:t> NULL [X3DMetadataObject]</a:t>
+            </a:r>
+            <a:endParaRPr sz="1000" dirty="0"/>
           </a:p>
           <a:p>
             <a:pPr marL="0" lvl="0" indent="0" algn="l" rtl="0">
@@ -8808,10 +9810,26 @@
               <a:buNone/>
             </a:pPr>
             <a:r>
-              <a:rPr lang="pt-BR" sz="1167"/>
-              <a:t>  SFBool  []       bottom   TRUE</a:t>
-            </a:r>
-            <a:endParaRPr/>
+              <a:rPr lang="pt-BR" sz="1000" dirty="0"/>
+              <a:t>  </a:t>
+            </a:r>
+            <a:r>
+              <a:rPr lang="pt-BR" sz="1000" dirty="0" err="1"/>
+              <a:t>SFBool</a:t>
+            </a:r>
+            <a:r>
+              <a:rPr lang="pt-BR" sz="1000" dirty="0"/>
+              <a:t>  []       </a:t>
+            </a:r>
+            <a:r>
+              <a:rPr lang="pt-BR" sz="1000" dirty="0" err="1"/>
+              <a:t>bottom</a:t>
+            </a:r>
+            <a:r>
+              <a:rPr lang="pt-BR" sz="1000" dirty="0"/>
+              <a:t>   TRUE</a:t>
+            </a:r>
+            <a:endParaRPr sz="1000" dirty="0"/>
           </a:p>
           <a:p>
             <a:pPr marL="0" lvl="0" indent="0" algn="l" rtl="0">
@@ -8828,10 +9846,26 @@
               <a:buNone/>
             </a:pPr>
             <a:r>
-              <a:rPr lang="pt-BR" sz="1167"/>
-              <a:t>  SFFloat []       height   2    (0,∞)</a:t>
-            </a:r>
-            <a:endParaRPr/>
+              <a:rPr lang="pt-BR" sz="1000" dirty="0"/>
+              <a:t>  </a:t>
+            </a:r>
+            <a:r>
+              <a:rPr lang="pt-BR" sz="1000" dirty="0" err="1"/>
+              <a:t>SFFloat</a:t>
+            </a:r>
+            <a:r>
+              <a:rPr lang="pt-BR" sz="1000" dirty="0"/>
+              <a:t> []       </a:t>
+            </a:r>
+            <a:r>
+              <a:rPr lang="pt-BR" sz="1000" dirty="0" err="1"/>
+              <a:t>height</a:t>
+            </a:r>
+            <a:r>
+              <a:rPr lang="pt-BR" sz="1000" dirty="0"/>
+              <a:t>   2    (0,∞)</a:t>
+            </a:r>
+            <a:endParaRPr sz="1000" dirty="0"/>
           </a:p>
           <a:p>
             <a:pPr marL="0" lvl="0" indent="0" algn="l" rtl="0">
@@ -8848,10 +9882,26 @@
               <a:buNone/>
             </a:pPr>
             <a:r>
-              <a:rPr lang="pt-BR" sz="1167"/>
-              <a:t>  SFFloat []       radius   1    (0,∞)</a:t>
-            </a:r>
-            <a:endParaRPr/>
+              <a:rPr lang="pt-BR" sz="1000" dirty="0"/>
+              <a:t>  </a:t>
+            </a:r>
+            <a:r>
+              <a:rPr lang="pt-BR" sz="1000" dirty="0" err="1"/>
+              <a:t>SFFloat</a:t>
+            </a:r>
+            <a:r>
+              <a:rPr lang="pt-BR" sz="1000" dirty="0"/>
+              <a:t> []       </a:t>
+            </a:r>
+            <a:r>
+              <a:rPr lang="pt-BR" sz="1000" dirty="0" err="1"/>
+              <a:t>radius</a:t>
+            </a:r>
+            <a:r>
+              <a:rPr lang="pt-BR" sz="1000" dirty="0"/>
+              <a:t>   1    (0,∞)</a:t>
+            </a:r>
+            <a:endParaRPr sz="1000" dirty="0"/>
           </a:p>
           <a:p>
             <a:pPr marL="0" lvl="0" indent="0" algn="l" rtl="0">
@@ -8868,10 +9918,26 @@
               <a:buNone/>
             </a:pPr>
             <a:r>
-              <a:rPr lang="pt-BR" sz="1167"/>
-              <a:t>  SFBool  []       side     TRUE</a:t>
-            </a:r>
-            <a:endParaRPr/>
+              <a:rPr lang="pt-BR" sz="1000" dirty="0"/>
+              <a:t>  </a:t>
+            </a:r>
+            <a:r>
+              <a:rPr lang="pt-BR" sz="1000" dirty="0" err="1"/>
+              <a:t>SFBool</a:t>
+            </a:r>
+            <a:r>
+              <a:rPr lang="pt-BR" sz="1000" dirty="0"/>
+              <a:t>  []       </a:t>
+            </a:r>
+            <a:r>
+              <a:rPr lang="pt-BR" sz="1000" dirty="0" err="1"/>
+              <a:t>side</a:t>
+            </a:r>
+            <a:r>
+              <a:rPr lang="pt-BR" sz="1000" dirty="0"/>
+              <a:t>     TRUE</a:t>
+            </a:r>
+            <a:endParaRPr sz="1000" dirty="0"/>
           </a:p>
           <a:p>
             <a:pPr marL="0" lvl="0" indent="0" algn="l" rtl="0">
@@ -8888,10 +9954,26 @@
               <a:buNone/>
             </a:pPr>
             <a:r>
-              <a:rPr lang="pt-BR" sz="1167"/>
-              <a:t>  SFBool  []       solid    TRUE</a:t>
-            </a:r>
-            <a:endParaRPr/>
+              <a:rPr lang="pt-BR" sz="1000" dirty="0"/>
+              <a:t>  </a:t>
+            </a:r>
+            <a:r>
+              <a:rPr lang="pt-BR" sz="1000" dirty="0" err="1"/>
+              <a:t>SFBool</a:t>
+            </a:r>
+            <a:r>
+              <a:rPr lang="pt-BR" sz="1000" dirty="0"/>
+              <a:t>  []       </a:t>
+            </a:r>
+            <a:r>
+              <a:rPr lang="pt-BR" sz="1000" dirty="0" err="1"/>
+              <a:t>solid</a:t>
+            </a:r>
+            <a:r>
+              <a:rPr lang="pt-BR" sz="1000" dirty="0"/>
+              <a:t>    TRUE</a:t>
+            </a:r>
+            <a:endParaRPr sz="1000" dirty="0"/>
           </a:p>
           <a:p>
             <a:pPr marL="0" lvl="0" indent="0" algn="l" rtl="0">
@@ -8908,10 +9990,18 @@
               <a:buNone/>
             </a:pPr>
             <a:r>
-              <a:rPr lang="pt-BR" sz="1167"/>
-              <a:t>  SFBool  []       top      TRUE</a:t>
-            </a:r>
-            <a:endParaRPr/>
+              <a:rPr lang="pt-BR" sz="1000" dirty="0"/>
+              <a:t>  </a:t>
+            </a:r>
+            <a:r>
+              <a:rPr lang="pt-BR" sz="1000" dirty="0" err="1"/>
+              <a:t>SFBool</a:t>
+            </a:r>
+            <a:r>
+              <a:rPr lang="pt-BR" sz="1000" dirty="0"/>
+              <a:t>  []       top      TRUE</a:t>
+            </a:r>
+            <a:endParaRPr sz="1000" dirty="0"/>
           </a:p>
           <a:p>
             <a:pPr marL="0" lvl="0" indent="0" algn="l" rtl="0">
@@ -8928,10 +10018,10 @@
               <a:buNone/>
             </a:pPr>
             <a:r>
-              <a:rPr lang="pt-BR" sz="1167"/>
+              <a:rPr lang="pt-BR" sz="1000" dirty="0"/>
               <a:t>}</a:t>
             </a:r>
-            <a:endParaRPr/>
+            <a:endParaRPr sz="1000" dirty="0"/>
           </a:p>
         </p:txBody>
       </p:sp>
@@ -8947,8 +10037,8 @@
         </p:nvSpPr>
         <p:spPr>
           <a:xfrm>
-            <a:off x="5291100" y="1124700"/>
-            <a:ext cx="3852900" cy="3989400"/>
+            <a:off x="4782311" y="1124700"/>
+            <a:ext cx="4197097" cy="3989400"/>
           </a:xfrm>
           <a:prstGeom prst="rect">
             <a:avLst/>
@@ -8979,7 +10069,7 @@
               <a:buNone/>
             </a:pPr>
             <a:r>
-              <a:rPr lang="pt-BR" sz="1167" b="0" i="0" u="none" strike="noStrike" cap="none">
+              <a:rPr lang="pt-BR" sz="1000" b="0" i="0" u="none" strike="noStrike" cap="none" dirty="0">
                 <a:solidFill>
                   <a:schemeClr val="dk1"/>
                 </a:solidFill>
@@ -8990,7 +10080,7 @@
               </a:rPr>
               <a:t>Cone : X3DGeometryNode { </a:t>
             </a:r>
-            <a:endParaRPr/>
+            <a:endParaRPr sz="1000" dirty="0"/>
           </a:p>
           <a:p>
             <a:pPr marL="285738" marR="0" lvl="0" indent="-285738" algn="l" rtl="0">
@@ -9008,7 +10098,7 @@
               <a:buNone/>
             </a:pPr>
             <a:r>
-              <a:rPr lang="pt-BR" sz="1167" b="0" i="0" u="none" strike="noStrike" cap="none">
+              <a:rPr lang="pt-BR" sz="1000" b="0" i="0" u="none" strike="noStrike" cap="none" dirty="0">
                 <a:solidFill>
                   <a:schemeClr val="dk1"/>
                 </a:solidFill>
@@ -9017,9 +10107,81 @@
                 <a:cs typeface="Verdana"/>
                 <a:sym typeface="Verdana"/>
               </a:rPr>
-              <a:t>  SFNode  [in,out] metadata     NULL [X3DMetadataObject]</a:t>
-            </a:r>
-            <a:endParaRPr/>
+              <a:t>  </a:t>
+            </a:r>
+            <a:r>
+              <a:rPr lang="pt-BR" sz="1000" b="0" i="0" u="none" strike="noStrike" cap="none" dirty="0" err="1">
+                <a:solidFill>
+                  <a:schemeClr val="dk1"/>
+                </a:solidFill>
+                <a:latin typeface="Verdana"/>
+                <a:ea typeface="Verdana"/>
+                <a:cs typeface="Verdana"/>
+                <a:sym typeface="Verdana"/>
+              </a:rPr>
+              <a:t>SFNode</a:t>
+            </a:r>
+            <a:r>
+              <a:rPr lang="pt-BR" sz="1000" b="0" i="0" u="none" strike="noStrike" cap="none" dirty="0">
+                <a:solidFill>
+                  <a:schemeClr val="dk1"/>
+                </a:solidFill>
+                <a:latin typeface="Verdana"/>
+                <a:ea typeface="Verdana"/>
+                <a:cs typeface="Verdana"/>
+                <a:sym typeface="Verdana"/>
+              </a:rPr>
+              <a:t>  [</a:t>
+            </a:r>
+            <a:r>
+              <a:rPr lang="pt-BR" sz="1000" b="0" i="0" u="none" strike="noStrike" cap="none" dirty="0" err="1">
+                <a:solidFill>
+                  <a:schemeClr val="dk1"/>
+                </a:solidFill>
+                <a:latin typeface="Verdana"/>
+                <a:ea typeface="Verdana"/>
+                <a:cs typeface="Verdana"/>
+                <a:sym typeface="Verdana"/>
+              </a:rPr>
+              <a:t>in,out</a:t>
+            </a:r>
+            <a:r>
+              <a:rPr lang="pt-BR" sz="1000" b="0" i="0" u="none" strike="noStrike" cap="none" dirty="0">
+                <a:solidFill>
+                  <a:schemeClr val="dk1"/>
+                </a:solidFill>
+                <a:latin typeface="Verdana"/>
+                <a:ea typeface="Verdana"/>
+                <a:cs typeface="Verdana"/>
+                <a:sym typeface="Verdana"/>
+              </a:rPr>
+              <a:t>] </a:t>
+            </a:r>
+            <a:r>
+              <a:rPr lang="pt-BR" sz="1000" b="0" i="0" u="none" strike="noStrike" cap="none" dirty="0" err="1">
+                <a:solidFill>
+                  <a:schemeClr val="dk1"/>
+                </a:solidFill>
+                <a:latin typeface="Verdana"/>
+                <a:ea typeface="Verdana"/>
+                <a:cs typeface="Verdana"/>
+                <a:sym typeface="Verdana"/>
+              </a:rPr>
+              <a:t>metadata</a:t>
+            </a:r>
+            <a:r>
+              <a:rPr lang="pt-BR" sz="1000" b="0" i="0" u="none" strike="noStrike" cap="none" dirty="0">
+                <a:solidFill>
+                  <a:schemeClr val="dk1"/>
+                </a:solidFill>
+                <a:latin typeface="Verdana"/>
+                <a:ea typeface="Verdana"/>
+                <a:cs typeface="Verdana"/>
+                <a:sym typeface="Verdana"/>
+              </a:rPr>
+              <a:t>     NULL [X3DMetadataObject]</a:t>
+            </a:r>
+            <a:endParaRPr sz="1000" dirty="0"/>
           </a:p>
           <a:p>
             <a:pPr marL="285738" marR="0" lvl="0" indent="-285738" algn="l" rtl="0">
@@ -9037,7 +10199,7 @@
               <a:buNone/>
             </a:pPr>
             <a:r>
-              <a:rPr lang="pt-BR" sz="1167" b="0" i="0" u="none" strike="noStrike" cap="none">
+              <a:rPr lang="pt-BR" sz="1000" b="0" i="0" u="none" strike="noStrike" cap="none" dirty="0">
                 <a:solidFill>
                   <a:schemeClr val="dk1"/>
                 </a:solidFill>
@@ -9046,9 +10208,57 @@
                 <a:cs typeface="Verdana"/>
                 <a:sym typeface="Verdana"/>
               </a:rPr>
-              <a:t>  SFBool  []       bottom       TRUE</a:t>
-            </a:r>
-            <a:endParaRPr/>
+              <a:t>  </a:t>
+            </a:r>
+            <a:r>
+              <a:rPr lang="pt-BR" sz="1000" b="0" i="0" u="none" strike="noStrike" cap="none" dirty="0" err="1">
+                <a:solidFill>
+                  <a:schemeClr val="dk1"/>
+                </a:solidFill>
+                <a:latin typeface="Verdana"/>
+                <a:ea typeface="Verdana"/>
+                <a:cs typeface="Verdana"/>
+                <a:sym typeface="Verdana"/>
+              </a:rPr>
+              <a:t>SFBool</a:t>
+            </a:r>
+            <a:r>
+              <a:rPr lang="pt-BR" sz="1000" b="0" i="0" u="none" strike="noStrike" cap="none" dirty="0">
+                <a:solidFill>
+                  <a:schemeClr val="dk1"/>
+                </a:solidFill>
+                <a:latin typeface="Verdana"/>
+                <a:ea typeface="Verdana"/>
+                <a:cs typeface="Verdana"/>
+                <a:sym typeface="Verdana"/>
+              </a:rPr>
+              <a:t>  []       </a:t>
+            </a:r>
+            <a:r>
+              <a:rPr lang="pt-BR" sz="1000" b="0" i="0" u="none" strike="noStrike" cap="none" dirty="0" err="1">
+                <a:solidFill>
+                  <a:schemeClr val="dk1"/>
+                </a:solidFill>
+                <a:latin typeface="Verdana"/>
+                <a:ea typeface="Verdana"/>
+                <a:cs typeface="Verdana"/>
+                <a:sym typeface="Verdana"/>
+              </a:rPr>
+              <a:t>bottom</a:t>
+            </a:r>
+            <a:r>
+              <a:rPr lang="pt-BR" sz="1000" b="0" i="0" u="none" strike="noStrike" cap="none" dirty="0">
+                <a:solidFill>
+                  <a:schemeClr val="dk1"/>
+                </a:solidFill>
+                <a:latin typeface="Verdana"/>
+                <a:ea typeface="Verdana"/>
+                <a:cs typeface="Verdana"/>
+                <a:sym typeface="Verdana"/>
+              </a:rPr>
+              <a:t>       TRUE</a:t>
+            </a:r>
+            <a:endParaRPr sz="1000" dirty="0"/>
           </a:p>
           <a:p>
             <a:pPr marL="285738" marR="0" lvl="0" indent="-285738" algn="l" rtl="0">
@@ -9066,7 +10276,7 @@
               <a:buNone/>
             </a:pPr>
             <a:r>
-              <a:rPr lang="pt-BR" sz="1167" b="0" i="0" u="none" strike="noStrike" cap="none">
+              <a:rPr lang="pt-BR" sz="1000" b="0" i="0" u="none" strike="noStrike" cap="none" dirty="0">
                 <a:solidFill>
                   <a:schemeClr val="dk1"/>
                 </a:solidFill>
@@ -9075,9 +10285,57 @@
                 <a:cs typeface="Verdana"/>
                 <a:sym typeface="Verdana"/>
               </a:rPr>
-              <a:t>  SFFloat []       bottomRadius 1    (0,∞)</a:t>
-            </a:r>
-            <a:endParaRPr/>
+              <a:t>  </a:t>
+            </a:r>
+            <a:r>
+              <a:rPr lang="pt-BR" sz="1000" b="0" i="0" u="none" strike="noStrike" cap="none" dirty="0" err="1">
+                <a:solidFill>
+                  <a:schemeClr val="dk1"/>
+                </a:solidFill>
+                <a:latin typeface="Verdana"/>
+                <a:ea typeface="Verdana"/>
+                <a:cs typeface="Verdana"/>
+                <a:sym typeface="Verdana"/>
+              </a:rPr>
+              <a:t>SFFloat</a:t>
+            </a:r>
+            <a:r>
+              <a:rPr lang="pt-BR" sz="1000" b="0" i="0" u="none" strike="noStrike" cap="none" dirty="0">
+                <a:solidFill>
+                  <a:schemeClr val="dk1"/>
+                </a:solidFill>
+                <a:latin typeface="Verdana"/>
+                <a:ea typeface="Verdana"/>
+                <a:cs typeface="Verdana"/>
+                <a:sym typeface="Verdana"/>
+              </a:rPr>
+              <a:t> []       </a:t>
+            </a:r>
+            <a:r>
+              <a:rPr lang="pt-BR" sz="1000" b="0" i="0" u="none" strike="noStrike" cap="none" dirty="0" err="1">
+                <a:solidFill>
+                  <a:schemeClr val="dk1"/>
+                </a:solidFill>
+                <a:latin typeface="Verdana"/>
+                <a:ea typeface="Verdana"/>
+                <a:cs typeface="Verdana"/>
+                <a:sym typeface="Verdana"/>
+              </a:rPr>
+              <a:t>bottomRadius</a:t>
+            </a:r>
+            <a:r>
+              <a:rPr lang="pt-BR" sz="1000" b="0" i="0" u="none" strike="noStrike" cap="none" dirty="0">
+                <a:solidFill>
+                  <a:schemeClr val="dk1"/>
+                </a:solidFill>
+                <a:latin typeface="Verdana"/>
+                <a:ea typeface="Verdana"/>
+                <a:cs typeface="Verdana"/>
+                <a:sym typeface="Verdana"/>
+              </a:rPr>
+              <a:t> 1    (0,∞)</a:t>
+            </a:r>
+            <a:endParaRPr sz="1000" dirty="0"/>
           </a:p>
           <a:p>
             <a:pPr marL="285738" marR="0" lvl="0" indent="-285738" algn="l" rtl="0">
@@ -9095,7 +10353,7 @@
               <a:buNone/>
             </a:pPr>
             <a:r>
-              <a:rPr lang="pt-BR" sz="1167" b="0" i="0" u="none" strike="noStrike" cap="none">
+              <a:rPr lang="pt-BR" sz="1000" b="0" i="0" u="none" strike="noStrike" cap="none" dirty="0">
                 <a:solidFill>
                   <a:schemeClr val="dk1"/>
                 </a:solidFill>
@@ -9104,9 +10362,57 @@
                 <a:cs typeface="Verdana"/>
                 <a:sym typeface="Verdana"/>
               </a:rPr>
-              <a:t>  SFFloat []       height       2    (0,∞)</a:t>
-            </a:r>
-            <a:endParaRPr/>
+              <a:t>  </a:t>
+            </a:r>
+            <a:r>
+              <a:rPr lang="pt-BR" sz="1000" b="0" i="0" u="none" strike="noStrike" cap="none" dirty="0" err="1">
+                <a:solidFill>
+                  <a:schemeClr val="dk1"/>
+                </a:solidFill>
+                <a:latin typeface="Verdana"/>
+                <a:ea typeface="Verdana"/>
+                <a:cs typeface="Verdana"/>
+                <a:sym typeface="Verdana"/>
+              </a:rPr>
+              <a:t>SFFloat</a:t>
+            </a:r>
+            <a:r>
+              <a:rPr lang="pt-BR" sz="1000" b="0" i="0" u="none" strike="noStrike" cap="none" dirty="0">
+                <a:solidFill>
+                  <a:schemeClr val="dk1"/>
+                </a:solidFill>
+                <a:latin typeface="Verdana"/>
+                <a:ea typeface="Verdana"/>
+                <a:cs typeface="Verdana"/>
+                <a:sym typeface="Verdana"/>
+              </a:rPr>
+              <a:t> []       </a:t>
+            </a:r>
+            <a:r>
+              <a:rPr lang="pt-BR" sz="1000" b="0" i="0" u="none" strike="noStrike" cap="none" dirty="0" err="1">
+                <a:solidFill>
+                  <a:schemeClr val="dk1"/>
+                </a:solidFill>
+                <a:latin typeface="Verdana"/>
+                <a:ea typeface="Verdana"/>
+                <a:cs typeface="Verdana"/>
+                <a:sym typeface="Verdana"/>
+              </a:rPr>
+              <a:t>height</a:t>
+            </a:r>
+            <a:r>
+              <a:rPr lang="pt-BR" sz="1000" b="0" i="0" u="none" strike="noStrike" cap="none" dirty="0">
+                <a:solidFill>
+                  <a:schemeClr val="dk1"/>
+                </a:solidFill>
+                <a:latin typeface="Verdana"/>
+                <a:ea typeface="Verdana"/>
+                <a:cs typeface="Verdana"/>
+                <a:sym typeface="Verdana"/>
+              </a:rPr>
+              <a:t>       2    (0,∞)</a:t>
+            </a:r>
+            <a:endParaRPr sz="1000" dirty="0"/>
           </a:p>
           <a:p>
             <a:pPr marL="285738" marR="0" lvl="0" indent="-285738" algn="l" rtl="0">
@@ -9124,7 +10430,7 @@
               <a:buNone/>
             </a:pPr>
             <a:r>
-              <a:rPr lang="pt-BR" sz="1167" b="0" i="0" u="none" strike="noStrike" cap="none">
+              <a:rPr lang="pt-BR" sz="1000" b="0" i="0" u="none" strike="noStrike" cap="none" dirty="0">
                 <a:solidFill>
                   <a:schemeClr val="dk1"/>
                 </a:solidFill>
@@ -9133,9 +10439,57 @@
                 <a:cs typeface="Verdana"/>
                 <a:sym typeface="Verdana"/>
               </a:rPr>
-              <a:t>  SFBool  []       side         TRUE</a:t>
-            </a:r>
-            <a:endParaRPr/>
+              <a:t>  </a:t>
+            </a:r>
+            <a:r>
+              <a:rPr lang="pt-BR" sz="1000" b="0" i="0" u="none" strike="noStrike" cap="none" dirty="0" err="1">
+                <a:solidFill>
+                  <a:schemeClr val="dk1"/>
+                </a:solidFill>
+                <a:latin typeface="Verdana"/>
+                <a:ea typeface="Verdana"/>
+                <a:cs typeface="Verdana"/>
+                <a:sym typeface="Verdana"/>
+              </a:rPr>
+              <a:t>SFBool</a:t>
+            </a:r>
+            <a:r>
+              <a:rPr lang="pt-BR" sz="1000" b="0" i="0" u="none" strike="noStrike" cap="none" dirty="0">
+                <a:solidFill>
+                  <a:schemeClr val="dk1"/>
+                </a:solidFill>
+                <a:latin typeface="Verdana"/>
+                <a:ea typeface="Verdana"/>
+                <a:cs typeface="Verdana"/>
+                <a:sym typeface="Verdana"/>
+              </a:rPr>
+              <a:t>  []       </a:t>
+            </a:r>
+            <a:r>
+              <a:rPr lang="pt-BR" sz="1000" b="0" i="0" u="none" strike="noStrike" cap="none" dirty="0" err="1">
+                <a:solidFill>
+                  <a:schemeClr val="dk1"/>
+                </a:solidFill>
+                <a:latin typeface="Verdana"/>
+                <a:ea typeface="Verdana"/>
+                <a:cs typeface="Verdana"/>
+                <a:sym typeface="Verdana"/>
+              </a:rPr>
+              <a:t>side</a:t>
+            </a:r>
+            <a:r>
+              <a:rPr lang="pt-BR" sz="1000" b="0" i="0" u="none" strike="noStrike" cap="none" dirty="0">
+                <a:solidFill>
+                  <a:schemeClr val="dk1"/>
+                </a:solidFill>
+                <a:latin typeface="Verdana"/>
+                <a:ea typeface="Verdana"/>
+                <a:cs typeface="Verdana"/>
+                <a:sym typeface="Verdana"/>
+              </a:rPr>
+              <a:t>         TRUE</a:t>
+            </a:r>
+            <a:endParaRPr sz="1000" dirty="0"/>
           </a:p>
           <a:p>
             <a:pPr marL="285738" marR="0" lvl="0" indent="-285738" algn="l" rtl="0">
@@ -9153,7 +10507,7 @@
               <a:buNone/>
             </a:pPr>
             <a:r>
-              <a:rPr lang="pt-BR" sz="1167" b="0" i="0" u="none" strike="noStrike" cap="none">
+              <a:rPr lang="pt-BR" sz="1000" b="0" i="0" u="none" strike="noStrike" cap="none" dirty="0">
                 <a:solidFill>
                   <a:schemeClr val="dk1"/>
                 </a:solidFill>
@@ -9162,9 +10516,57 @@
                 <a:cs typeface="Verdana"/>
                 <a:sym typeface="Verdana"/>
               </a:rPr>
-              <a:t>  SFBool  []       solid        TRUE</a:t>
-            </a:r>
-            <a:endParaRPr/>
+              <a:t>  </a:t>
+            </a:r>
+            <a:r>
+              <a:rPr lang="pt-BR" sz="1000" b="0" i="0" u="none" strike="noStrike" cap="none" dirty="0" err="1">
+                <a:solidFill>
+                  <a:schemeClr val="dk1"/>
+                </a:solidFill>
+                <a:latin typeface="Verdana"/>
+                <a:ea typeface="Verdana"/>
+                <a:cs typeface="Verdana"/>
+                <a:sym typeface="Verdana"/>
+              </a:rPr>
+              <a:t>SFBool</a:t>
+            </a:r>
+            <a:r>
+              <a:rPr lang="pt-BR" sz="1000" b="0" i="0" u="none" strike="noStrike" cap="none" dirty="0">
+                <a:solidFill>
+                  <a:schemeClr val="dk1"/>
+                </a:solidFill>
+                <a:latin typeface="Verdana"/>
+                <a:ea typeface="Verdana"/>
+                <a:cs typeface="Verdana"/>
+                <a:sym typeface="Verdana"/>
+              </a:rPr>
+              <a:t>  []       </a:t>
+            </a:r>
+            <a:r>
+              <a:rPr lang="pt-BR" sz="1000" b="0" i="0" u="none" strike="noStrike" cap="none" dirty="0" err="1">
+                <a:solidFill>
+                  <a:schemeClr val="dk1"/>
+                </a:solidFill>
+                <a:latin typeface="Verdana"/>
+                <a:ea typeface="Verdana"/>
+                <a:cs typeface="Verdana"/>
+                <a:sym typeface="Verdana"/>
+              </a:rPr>
+              <a:t>solid</a:t>
+            </a:r>
+            <a:r>
+              <a:rPr lang="pt-BR" sz="1000" b="0" i="0" u="none" strike="noStrike" cap="none" dirty="0">
+                <a:solidFill>
+                  <a:schemeClr val="dk1"/>
+                </a:solidFill>
+                <a:latin typeface="Verdana"/>
+                <a:ea typeface="Verdana"/>
+                <a:cs typeface="Verdana"/>
+                <a:sym typeface="Verdana"/>
+              </a:rPr>
+              <a:t>        TRUE</a:t>
+            </a:r>
+            <a:endParaRPr sz="1000" dirty="0"/>
           </a:p>
           <a:p>
             <a:pPr marL="285738" marR="0" lvl="0" indent="-285738" algn="l" rtl="0">
@@ -9182,7 +10584,7 @@
               <a:buNone/>
             </a:pPr>
             <a:r>
-              <a:rPr lang="pt-BR" sz="1167" b="0" i="0" u="none" strike="noStrike" cap="none">
+              <a:rPr lang="pt-BR" sz="1000" b="0" i="0" u="none" strike="noStrike" cap="none" dirty="0">
                 <a:solidFill>
                   <a:schemeClr val="dk1"/>
                 </a:solidFill>
@@ -9193,7 +10595,7 @@
               </a:rPr>
               <a:t>}</a:t>
             </a:r>
-            <a:endParaRPr/>
+            <a:endParaRPr sz="1000" dirty="0"/>
           </a:p>
           <a:p>
             <a:pPr marL="285738" marR="0" lvl="0" indent="-285738" algn="l" rtl="0">
@@ -9210,7 +10612,7 @@
               <a:buFont typeface="Arial"/>
               <a:buNone/>
             </a:pPr>
-            <a:endParaRPr sz="1167" b="0" i="0" u="none" strike="noStrike" cap="none">
+            <a:endParaRPr sz="1000" b="0" i="0" u="none" strike="noStrike" cap="none" dirty="0">
               <a:solidFill>
                 <a:schemeClr val="dk1"/>
               </a:solidFill>
@@ -9235,7 +10637,7 @@
               <a:buFont typeface="Arial"/>
               <a:buNone/>
             </a:pPr>
-            <a:endParaRPr sz="1167" b="0" i="0" u="none" strike="noStrike" cap="none">
+            <a:endParaRPr sz="1000" b="0" i="0" u="none" strike="noStrike" cap="none" dirty="0">
               <a:solidFill>
                 <a:schemeClr val="dk1"/>
               </a:solidFill>
@@ -9261,7 +10663,7 @@
               <a:buNone/>
             </a:pPr>
             <a:r>
-              <a:rPr lang="pt-BR" sz="1167" b="0" i="0" u="none" strike="noStrike" cap="none">
+              <a:rPr lang="pt-BR" sz="1000" b="1" i="0" u="none" strike="noStrike" cap="none" dirty="0" err="1">
                 <a:solidFill>
                   <a:schemeClr val="dk1"/>
                 </a:solidFill>
@@ -9270,9 +10672,21 @@
                 <a:cs typeface="Verdana"/>
                 <a:sym typeface="Verdana"/>
               </a:rPr>
-              <a:t>Sphere : X3DGeometryNode { </a:t>
-            </a:r>
-            <a:endParaRPr/>
+              <a:t>Sphere</a:t>
+            </a:r>
+            <a:r>
+              <a:rPr lang="pt-BR" sz="1000" b="1" i="0" u="none" strike="noStrike" cap="none" dirty="0">
+                <a:solidFill>
+                  <a:schemeClr val="dk1"/>
+                </a:solidFill>
+                <a:latin typeface="Verdana"/>
+                <a:ea typeface="Verdana"/>
+                <a:cs typeface="Verdana"/>
+                <a:sym typeface="Verdana"/>
+              </a:rPr>
+              <a:t> : X3DGeometryNode { </a:t>
+            </a:r>
+            <a:endParaRPr sz="1000" b="1" dirty="0"/>
           </a:p>
           <a:p>
             <a:pPr marL="285738" marR="0" lvl="0" indent="-285738" algn="l" rtl="0">
@@ -9290,7 +10704,7 @@
               <a:buNone/>
             </a:pPr>
             <a:r>
-              <a:rPr lang="pt-BR" sz="1167" b="0" i="0" u="none" strike="noStrike" cap="none">
+              <a:rPr lang="pt-BR" sz="1000" b="1" i="0" u="none" strike="noStrike" cap="none" dirty="0">
                 <a:solidFill>
                   <a:schemeClr val="dk1"/>
                 </a:solidFill>
@@ -9299,9 +10713,81 @@
                 <a:cs typeface="Verdana"/>
                 <a:sym typeface="Verdana"/>
               </a:rPr>
-              <a:t>  SFNode  [in,out] metadata NULL [X3DMetadataObject]</a:t>
-            </a:r>
-            <a:endParaRPr/>
+              <a:t>  </a:t>
+            </a:r>
+            <a:r>
+              <a:rPr lang="pt-BR" sz="1000" b="1" i="0" u="none" strike="noStrike" cap="none" dirty="0" err="1">
+                <a:solidFill>
+                  <a:schemeClr val="dk1"/>
+                </a:solidFill>
+                <a:latin typeface="Verdana"/>
+                <a:ea typeface="Verdana"/>
+                <a:cs typeface="Verdana"/>
+                <a:sym typeface="Verdana"/>
+              </a:rPr>
+              <a:t>SFNode</a:t>
+            </a:r>
+            <a:r>
+              <a:rPr lang="pt-BR" sz="1000" b="1" i="0" u="none" strike="noStrike" cap="none" dirty="0">
+                <a:solidFill>
+                  <a:schemeClr val="dk1"/>
+                </a:solidFill>
+                <a:latin typeface="Verdana"/>
+                <a:ea typeface="Verdana"/>
+                <a:cs typeface="Verdana"/>
+                <a:sym typeface="Verdana"/>
+              </a:rPr>
+              <a:t>  [</a:t>
+            </a:r>
+            <a:r>
+              <a:rPr lang="pt-BR" sz="1000" b="1" i="0" u="none" strike="noStrike" cap="none" dirty="0" err="1">
+                <a:solidFill>
+                  <a:schemeClr val="dk1"/>
+                </a:solidFill>
+                <a:latin typeface="Verdana"/>
+                <a:ea typeface="Verdana"/>
+                <a:cs typeface="Verdana"/>
+                <a:sym typeface="Verdana"/>
+              </a:rPr>
+              <a:t>in,out</a:t>
+            </a:r>
+            <a:r>
+              <a:rPr lang="pt-BR" sz="1000" b="1" i="0" u="none" strike="noStrike" cap="none" dirty="0">
+                <a:solidFill>
+                  <a:schemeClr val="dk1"/>
+                </a:solidFill>
+                <a:latin typeface="Verdana"/>
+                <a:ea typeface="Verdana"/>
+                <a:cs typeface="Verdana"/>
+                <a:sym typeface="Verdana"/>
+              </a:rPr>
+              <a:t>] </a:t>
+            </a:r>
+            <a:r>
+              <a:rPr lang="pt-BR" sz="1000" b="1" i="0" u="none" strike="noStrike" cap="none" dirty="0" err="1">
+                <a:solidFill>
+                  <a:schemeClr val="dk1"/>
+                </a:solidFill>
+                <a:latin typeface="Verdana"/>
+                <a:ea typeface="Verdana"/>
+                <a:cs typeface="Verdana"/>
+                <a:sym typeface="Verdana"/>
+              </a:rPr>
+              <a:t>metadata</a:t>
+            </a:r>
+            <a:r>
+              <a:rPr lang="pt-BR" sz="1000" b="1" i="0" u="none" strike="noStrike" cap="none" dirty="0">
+                <a:solidFill>
+                  <a:schemeClr val="dk1"/>
+                </a:solidFill>
+                <a:latin typeface="Verdana"/>
+                <a:ea typeface="Verdana"/>
+                <a:cs typeface="Verdana"/>
+                <a:sym typeface="Verdana"/>
+              </a:rPr>
+              <a:t> NULL [X3DMetadataObject]</a:t>
+            </a:r>
+            <a:endParaRPr sz="1000" b="1" dirty="0"/>
           </a:p>
           <a:p>
             <a:pPr marL="285738" marR="0" lvl="0" indent="-285738" algn="l" rtl="0">
@@ -9319,7 +10805,7 @@
               <a:buNone/>
             </a:pPr>
             <a:r>
-              <a:rPr lang="pt-BR" sz="1167" b="0" i="0" u="none" strike="noStrike" cap="none">
+              <a:rPr lang="pt-BR" sz="1000" b="1" i="0" u="none" strike="noStrike" cap="none" dirty="0">
                 <a:solidFill>
                   <a:schemeClr val="dk1"/>
                 </a:solidFill>
@@ -9328,9 +10814,57 @@
                 <a:cs typeface="Verdana"/>
                 <a:sym typeface="Verdana"/>
               </a:rPr>
-              <a:t>  SFFloat []       radius   1    (0,∞)</a:t>
-            </a:r>
-            <a:endParaRPr/>
+              <a:t>  </a:t>
+            </a:r>
+            <a:r>
+              <a:rPr lang="pt-BR" sz="1000" b="1" i="0" u="none" strike="noStrike" cap="none" dirty="0" err="1">
+                <a:solidFill>
+                  <a:schemeClr val="dk1"/>
+                </a:solidFill>
+                <a:latin typeface="Verdana"/>
+                <a:ea typeface="Verdana"/>
+                <a:cs typeface="Verdana"/>
+                <a:sym typeface="Verdana"/>
+              </a:rPr>
+              <a:t>SFFloat</a:t>
+            </a:r>
+            <a:r>
+              <a:rPr lang="pt-BR" sz="1000" b="1" i="0" u="none" strike="noStrike" cap="none" dirty="0">
+                <a:solidFill>
+                  <a:schemeClr val="dk1"/>
+                </a:solidFill>
+                <a:latin typeface="Verdana"/>
+                <a:ea typeface="Verdana"/>
+                <a:cs typeface="Verdana"/>
+                <a:sym typeface="Verdana"/>
+              </a:rPr>
+              <a:t> []       </a:t>
+            </a:r>
+            <a:r>
+              <a:rPr lang="pt-BR" sz="1000" b="1" i="0" u="none" strike="noStrike" cap="none" dirty="0" err="1">
+                <a:solidFill>
+                  <a:schemeClr val="dk1"/>
+                </a:solidFill>
+                <a:latin typeface="Verdana"/>
+                <a:ea typeface="Verdana"/>
+                <a:cs typeface="Verdana"/>
+                <a:sym typeface="Verdana"/>
+              </a:rPr>
+              <a:t>radius</a:t>
+            </a:r>
+            <a:r>
+              <a:rPr lang="pt-BR" sz="1000" b="1" i="0" u="none" strike="noStrike" cap="none" dirty="0">
+                <a:solidFill>
+                  <a:schemeClr val="dk1"/>
+                </a:solidFill>
+                <a:latin typeface="Verdana"/>
+                <a:ea typeface="Verdana"/>
+                <a:cs typeface="Verdana"/>
+                <a:sym typeface="Verdana"/>
+              </a:rPr>
+              <a:t>   1    (0,∞)</a:t>
+            </a:r>
+            <a:endParaRPr sz="1000" b="1" dirty="0"/>
           </a:p>
           <a:p>
             <a:pPr marL="285738" marR="0" lvl="0" indent="-285738" algn="l" rtl="0">
@@ -9348,7 +10882,7 @@
               <a:buNone/>
             </a:pPr>
             <a:r>
-              <a:rPr lang="pt-BR" sz="1167" b="0" i="0" u="none" strike="noStrike" cap="none">
+              <a:rPr lang="pt-BR" sz="1000" b="1" i="0" u="none" strike="noStrike" cap="none" dirty="0">
                 <a:solidFill>
                   <a:schemeClr val="dk1"/>
                 </a:solidFill>
@@ -9357,9 +10891,57 @@
                 <a:cs typeface="Verdana"/>
                 <a:sym typeface="Verdana"/>
               </a:rPr>
-              <a:t>  SFBool  []       solid    TRUE</a:t>
-            </a:r>
-            <a:endParaRPr/>
+              <a:t>  </a:t>
+            </a:r>
+            <a:r>
+              <a:rPr lang="pt-BR" sz="1000" b="1" i="0" u="none" strike="noStrike" cap="none" dirty="0" err="1">
+                <a:solidFill>
+                  <a:schemeClr val="dk1"/>
+                </a:solidFill>
+                <a:latin typeface="Verdana"/>
+                <a:ea typeface="Verdana"/>
+                <a:cs typeface="Verdana"/>
+                <a:sym typeface="Verdana"/>
+              </a:rPr>
+              <a:t>SFBool</a:t>
+            </a:r>
+            <a:r>
+              <a:rPr lang="pt-BR" sz="1000" b="1" i="0" u="none" strike="noStrike" cap="none" dirty="0">
+                <a:solidFill>
+                  <a:schemeClr val="dk1"/>
+                </a:solidFill>
+                <a:latin typeface="Verdana"/>
+                <a:ea typeface="Verdana"/>
+                <a:cs typeface="Verdana"/>
+                <a:sym typeface="Verdana"/>
+              </a:rPr>
+              <a:t>  []       </a:t>
+            </a:r>
+            <a:r>
+              <a:rPr lang="pt-BR" sz="1000" b="1" i="0" u="none" strike="noStrike" cap="none" dirty="0" err="1">
+                <a:solidFill>
+                  <a:schemeClr val="dk1"/>
+                </a:solidFill>
+                <a:latin typeface="Verdana"/>
+                <a:ea typeface="Verdana"/>
+                <a:cs typeface="Verdana"/>
+                <a:sym typeface="Verdana"/>
+              </a:rPr>
+              <a:t>solid</a:t>
+            </a:r>
+            <a:r>
+              <a:rPr lang="pt-BR" sz="1000" b="1" i="0" u="none" strike="noStrike" cap="none" dirty="0">
+                <a:solidFill>
+                  <a:schemeClr val="dk1"/>
+                </a:solidFill>
+                <a:latin typeface="Verdana"/>
+                <a:ea typeface="Verdana"/>
+                <a:cs typeface="Verdana"/>
+                <a:sym typeface="Verdana"/>
+              </a:rPr>
+              <a:t>    TRUE</a:t>
+            </a:r>
+            <a:endParaRPr sz="1000" b="1" dirty="0"/>
           </a:p>
           <a:p>
             <a:pPr marL="285738" marR="0" lvl="0" indent="-285738" algn="l" rtl="0">
@@ -9377,7 +10959,7 @@
               <a:buNone/>
             </a:pPr>
             <a:r>
-              <a:rPr lang="pt-BR" sz="1167" b="0" i="0" u="none" strike="noStrike" cap="none">
+              <a:rPr lang="pt-BR" sz="1000" b="1" i="0" u="none" strike="noStrike" cap="none" dirty="0">
                 <a:solidFill>
                   <a:schemeClr val="dk1"/>
                 </a:solidFill>
@@ -9388,7 +10970,7 @@
               </a:rPr>
               <a:t>}</a:t>
             </a:r>
-            <a:endParaRPr/>
+            <a:endParaRPr sz="1000" b="1" dirty="0"/>
           </a:p>
           <a:p>
             <a:pPr marL="285738" marR="0" lvl="0" indent="-285738" algn="l" rtl="0">
@@ -9405,7 +10987,7 @@
               <a:buFont typeface="Arial"/>
               <a:buNone/>
             </a:pPr>
-            <a:endParaRPr sz="1167" b="0" i="0" u="none" strike="noStrike" cap="none">
+            <a:endParaRPr sz="1000" b="0" i="0" u="none" strike="noStrike" cap="none" dirty="0">
               <a:solidFill>
                 <a:schemeClr val="dk1"/>
               </a:solidFill>
@@ -9425,467 +11007,6 @@
   <p:transition>
     <p:fade/>
   </p:transition>
-</p:sld>
-</file>
-
-<file path=ppt/slides/slide9.xml><?xml version="1.0" encoding="utf-8"?>
-<p:sld xmlns:a="http://schemas.openxmlformats.org/drawingml/2006/main" xmlns:r="http://schemas.openxmlformats.org/officeDocument/2006/relationships" xmlns:p="http://schemas.openxmlformats.org/presentationml/2006/main">
-  <p:cSld>
-    <p:spTree>
-      <p:nvGrpSpPr>
-        <p:cNvPr id="1" name="Shape 755"/>
-        <p:cNvGrpSpPr/>
-        <p:nvPr/>
-      </p:nvGrpSpPr>
-      <p:grpSpPr>
-        <a:xfrm>
-          <a:off x="0" y="0"/>
-          <a:ext cx="0" cy="0"/>
-          <a:chOff x="0" y="0"/>
-          <a:chExt cx="0" cy="0"/>
-        </a:xfrm>
-      </p:grpSpPr>
-      <p:sp>
-        <p:nvSpPr>
-          <p:cNvPr id="756" name="Google Shape;756;p74"/>
-          <p:cNvSpPr txBox="1">
-            <a:spLocks noGrp="1"/>
-          </p:cNvSpPr>
-          <p:nvPr>
-            <p:ph type="title"/>
-          </p:nvPr>
-        </p:nvSpPr>
-        <p:spPr>
-          <a:xfrm>
-            <a:off x="84172" y="113717"/>
-            <a:ext cx="8428200" cy="516000"/>
-          </a:xfrm>
-          <a:prstGeom prst="rect">
-            <a:avLst/>
-          </a:prstGeom>
-          <a:noFill/>
-          <a:ln>
-            <a:noFill/>
-          </a:ln>
-        </p:spPr>
-        <p:txBody>
-          <a:bodyPr spcFirstLastPara="1" wrap="square" lIns="91425" tIns="45700" rIns="91425" bIns="45700" anchor="t" anchorCtr="0">
-            <a:noAutofit/>
-          </a:bodyPr>
-          <a:lstStyle/>
-          <a:p>
-            <a:pPr marL="0" lvl="0" indent="0" algn="l" rtl="0">
-              <a:spcBef>
-                <a:spcPts val="0"/>
-              </a:spcBef>
-              <a:spcAft>
-                <a:spcPts val="0"/>
-              </a:spcAft>
-              <a:buClr>
-                <a:srgbClr val="C00026"/>
-              </a:buClr>
-              <a:buSzPts val="2600"/>
-              <a:buFont typeface="Verdana"/>
-              <a:buNone/>
-            </a:pPr>
-            <a:r>
-              <a:rPr lang="pt-BR" dirty="0"/>
-              <a:t>Quinta parte do projeto 1</a:t>
-            </a:r>
-            <a:endParaRPr dirty="0"/>
-          </a:p>
-        </p:txBody>
-      </p:sp>
-      <p:sp>
-        <p:nvSpPr>
-          <p:cNvPr id="757" name="Google Shape;757;p74"/>
-          <p:cNvSpPr txBox="1">
-            <a:spLocks noGrp="1"/>
-          </p:cNvSpPr>
-          <p:nvPr>
-            <p:ph type="sldNum" idx="12"/>
-          </p:nvPr>
-        </p:nvSpPr>
-        <p:spPr>
-          <a:xfrm>
-            <a:off x="0" y="5410729"/>
-            <a:ext cx="474900" cy="304200"/>
-          </a:xfrm>
-          <a:prstGeom prst="rect">
-            <a:avLst/>
-          </a:prstGeom>
-          <a:noFill/>
-          <a:ln>
-            <a:noFill/>
-          </a:ln>
-        </p:spPr>
-        <p:txBody>
-          <a:bodyPr spcFirstLastPara="1" wrap="square" lIns="91425" tIns="45700" rIns="91425" bIns="45700" anchor="ctr" anchorCtr="0">
-            <a:noAutofit/>
-          </a:bodyPr>
-          <a:lstStyle/>
-          <a:p>
-            <a:pPr marL="0" lvl="0" indent="0" algn="ctr" rtl="0">
-              <a:spcBef>
-                <a:spcPts val="0"/>
-              </a:spcBef>
-              <a:spcAft>
-                <a:spcPts val="0"/>
-              </a:spcAft>
-              <a:buClr>
-                <a:srgbClr val="000000"/>
-              </a:buClr>
-              <a:buFont typeface="Arial"/>
-              <a:buNone/>
-            </a:pPr>
-            <a:fld id="{00000000-1234-1234-1234-123412341234}" type="slidenum">
-              <a:rPr lang="pt-BR"/>
-              <a:t>9</a:t>
-            </a:fld>
-            <a:endParaRPr/>
-          </a:p>
-        </p:txBody>
-      </p:sp>
-      <p:sp>
-        <p:nvSpPr>
-          <p:cNvPr id="762" name="Google Shape;762;p74"/>
-          <p:cNvSpPr/>
-          <p:nvPr/>
-        </p:nvSpPr>
-        <p:spPr>
-          <a:xfrm>
-            <a:off x="1869618" y="2488188"/>
-            <a:ext cx="2162700" cy="369300"/>
-          </a:xfrm>
-          <a:prstGeom prst="rect">
-            <a:avLst/>
-          </a:prstGeom>
-          <a:noFill/>
-          <a:ln>
-            <a:noFill/>
-          </a:ln>
-        </p:spPr>
-        <p:txBody>
-          <a:bodyPr spcFirstLastPara="1" wrap="square" lIns="91425" tIns="45700" rIns="91425" bIns="45700" anchor="t" anchorCtr="0">
-            <a:noAutofit/>
-          </a:bodyPr>
-          <a:lstStyle/>
-          <a:p>
-            <a:pPr marL="0" marR="0" lvl="0" indent="0" algn="ctr" rtl="0">
-              <a:spcBef>
-                <a:spcPts val="0"/>
-              </a:spcBef>
-              <a:spcAft>
-                <a:spcPts val="0"/>
-              </a:spcAft>
-              <a:buNone/>
-            </a:pPr>
-            <a:r>
-              <a:rPr lang="pt-BR" sz="1600">
-                <a:solidFill>
-                  <a:schemeClr val="dk1"/>
-                </a:solidFill>
-              </a:rPr>
-              <a:t>textura</a:t>
-            </a:r>
-            <a:r>
-              <a:rPr lang="pt-BR" sz="1600">
-                <a:solidFill>
-                  <a:schemeClr val="dk1"/>
-                </a:solidFill>
-                <a:latin typeface="Arial"/>
-                <a:ea typeface="Arial"/>
-                <a:cs typeface="Arial"/>
-                <a:sym typeface="Arial"/>
-              </a:rPr>
-              <a:t>.x3d</a:t>
-            </a:r>
-            <a:endParaRPr sz="1200"/>
-          </a:p>
-        </p:txBody>
-      </p:sp>
-      <p:sp>
-        <p:nvSpPr>
-          <p:cNvPr id="763" name="Google Shape;763;p74"/>
-          <p:cNvSpPr/>
-          <p:nvPr/>
-        </p:nvSpPr>
-        <p:spPr>
-          <a:xfrm>
-            <a:off x="2565712" y="5115192"/>
-            <a:ext cx="4065600" cy="369300"/>
-          </a:xfrm>
-          <a:prstGeom prst="rect">
-            <a:avLst/>
-          </a:prstGeom>
-          <a:noFill/>
-          <a:ln>
-            <a:noFill/>
-          </a:ln>
-        </p:spPr>
-        <p:txBody>
-          <a:bodyPr spcFirstLastPara="1" wrap="square" lIns="91425" tIns="45700" rIns="91425" bIns="45700" anchor="t" anchorCtr="0">
-            <a:noAutofit/>
-          </a:bodyPr>
-          <a:lstStyle/>
-          <a:p>
-            <a:pPr marL="0" marR="0" lvl="0" indent="0" algn="l" rtl="0">
-              <a:spcBef>
-                <a:spcPts val="0"/>
-              </a:spcBef>
-              <a:spcAft>
-                <a:spcPts val="0"/>
-              </a:spcAft>
-              <a:buNone/>
-            </a:pPr>
-            <a:r>
-              <a:rPr lang="pt-BR" sz="1700" u="sng">
-                <a:solidFill>
-                  <a:schemeClr val="dk1"/>
-                </a:solidFill>
-                <a:latin typeface="Arial"/>
-                <a:ea typeface="Arial"/>
-                <a:cs typeface="Arial"/>
-                <a:sym typeface="Arial"/>
-                <a:hlinkClick r:id="rId3">
-                  <a:extLst>
-                    <a:ext uri="{A12FA001-AC4F-418D-AE19-62706E023703}">
-                      <ahyp:hlinkClr xmlns:ahyp="http://schemas.microsoft.com/office/drawing/2018/hyperlinkcolor" val="tx"/>
-                    </a:ext>
-                  </a:extLst>
-                </a:hlinkClick>
-              </a:rPr>
-              <a:t>https://lpsoares.github.io/Renderizador/</a:t>
-            </a:r>
-            <a:r>
-              <a:rPr lang="pt-BR" sz="1700">
-                <a:solidFill>
-                  <a:schemeClr val="dk1"/>
-                </a:solidFill>
-                <a:latin typeface="Arial"/>
-                <a:ea typeface="Arial"/>
-                <a:cs typeface="Arial"/>
-                <a:sym typeface="Arial"/>
-              </a:rPr>
-              <a:t> </a:t>
-            </a:r>
-            <a:endParaRPr sz="1300"/>
-          </a:p>
-        </p:txBody>
-      </p:sp>
-      <p:pic>
-        <p:nvPicPr>
-          <p:cNvPr id="768" name="Google Shape;768;p74"/>
-          <p:cNvPicPr preferRelativeResize="0"/>
-          <p:nvPr/>
-        </p:nvPicPr>
-        <p:blipFill>
-          <a:blip r:embed="rId4">
-            <a:alphaModFix/>
-          </a:blip>
-          <a:stretch>
-            <a:fillRect/>
-          </a:stretch>
-        </p:blipFill>
-        <p:spPr>
-          <a:xfrm>
-            <a:off x="1667930" y="1055787"/>
-            <a:ext cx="2566074" cy="1432700"/>
-          </a:xfrm>
-          <a:prstGeom prst="rect">
-            <a:avLst/>
-          </a:prstGeom>
-          <a:noFill/>
-          <a:ln>
-            <a:noFill/>
-          </a:ln>
-        </p:spPr>
-      </p:pic>
-      <p:sp>
-        <p:nvSpPr>
-          <p:cNvPr id="769" name="Google Shape;769;p74"/>
-          <p:cNvSpPr/>
-          <p:nvPr/>
-        </p:nvSpPr>
-        <p:spPr>
-          <a:xfrm>
-            <a:off x="4854856" y="2488200"/>
-            <a:ext cx="2136900" cy="369300"/>
-          </a:xfrm>
-          <a:prstGeom prst="rect">
-            <a:avLst/>
-          </a:prstGeom>
-          <a:noFill/>
-          <a:ln>
-            <a:noFill/>
-          </a:ln>
-        </p:spPr>
-        <p:txBody>
-          <a:bodyPr spcFirstLastPara="1" wrap="square" lIns="91425" tIns="45700" rIns="91425" bIns="45700" anchor="t" anchorCtr="0">
-            <a:noAutofit/>
-          </a:bodyPr>
-          <a:lstStyle/>
-          <a:p>
-            <a:pPr marL="0" marR="0" lvl="0" indent="0" algn="ctr" rtl="0">
-              <a:spcBef>
-                <a:spcPts val="0"/>
-              </a:spcBef>
-              <a:spcAft>
-                <a:spcPts val="0"/>
-              </a:spcAft>
-              <a:buNone/>
-            </a:pPr>
-            <a:r>
-              <a:rPr lang="pt-BR" sz="1600">
-                <a:solidFill>
-                  <a:schemeClr val="dk1"/>
-                </a:solidFill>
-              </a:rPr>
-              <a:t>texturas</a:t>
-            </a:r>
-            <a:r>
-              <a:rPr lang="pt-BR" sz="1600">
-                <a:solidFill>
-                  <a:schemeClr val="dk1"/>
-                </a:solidFill>
-                <a:latin typeface="Arial"/>
-                <a:ea typeface="Arial"/>
-                <a:cs typeface="Arial"/>
-                <a:sym typeface="Arial"/>
-              </a:rPr>
-              <a:t>.x3d</a:t>
-            </a:r>
-            <a:endParaRPr sz="1200"/>
-          </a:p>
-        </p:txBody>
-      </p:sp>
-      <p:pic>
-        <p:nvPicPr>
-          <p:cNvPr id="770" name="Google Shape;770;p74"/>
-          <p:cNvPicPr preferRelativeResize="0"/>
-          <p:nvPr/>
-        </p:nvPicPr>
-        <p:blipFill>
-          <a:blip r:embed="rId5">
-            <a:alphaModFix/>
-          </a:blip>
-          <a:stretch>
-            <a:fillRect/>
-          </a:stretch>
-        </p:blipFill>
-        <p:spPr>
-          <a:xfrm>
-            <a:off x="4827706" y="1036088"/>
-            <a:ext cx="2163994" cy="1442663"/>
-          </a:xfrm>
-          <a:prstGeom prst="rect">
-            <a:avLst/>
-          </a:prstGeom>
-          <a:noFill/>
-          <a:ln>
-            <a:noFill/>
-          </a:ln>
-        </p:spPr>
-      </p:pic>
-      <p:sp>
-        <p:nvSpPr>
-          <p:cNvPr id="2" name="Google Shape;762;p74">
-            <a:extLst>
-              <a:ext uri="{FF2B5EF4-FFF2-40B4-BE49-F238E27FC236}">
-                <a16:creationId xmlns:a16="http://schemas.microsoft.com/office/drawing/2014/main" id="{89100981-2626-FB6D-F6EB-BF66AD56F810}"/>
-              </a:ext>
-            </a:extLst>
-          </p:cNvPr>
-          <p:cNvSpPr/>
-          <p:nvPr/>
-        </p:nvSpPr>
-        <p:spPr>
-          <a:xfrm>
-            <a:off x="3490650" y="4474563"/>
-            <a:ext cx="2162700" cy="369300"/>
-          </a:xfrm>
-          <a:prstGeom prst="rect">
-            <a:avLst/>
-          </a:prstGeom>
-          <a:noFill/>
-          <a:ln>
-            <a:noFill/>
-          </a:ln>
-        </p:spPr>
-        <p:txBody>
-          <a:bodyPr spcFirstLastPara="1" wrap="square" lIns="91425" tIns="45700" rIns="91425" bIns="45700" anchor="t" anchorCtr="0">
-            <a:noAutofit/>
-          </a:bodyPr>
-          <a:lstStyle/>
-          <a:p>
-            <a:pPr marL="0" marR="0" lvl="0" indent="0" algn="ctr" rtl="0">
-              <a:spcBef>
-                <a:spcPts val="0"/>
-              </a:spcBef>
-              <a:spcAft>
-                <a:spcPts val="0"/>
-              </a:spcAft>
-              <a:buNone/>
-            </a:pPr>
-            <a:r>
-              <a:rPr lang="pt-BR" sz="1600" dirty="0">
-                <a:solidFill>
-                  <a:schemeClr val="dk1"/>
-                </a:solidFill>
-              </a:rPr>
-              <a:t>primitivas</a:t>
-            </a:r>
-            <a:r>
-              <a:rPr lang="pt-BR" sz="1600" dirty="0">
-                <a:solidFill>
-                  <a:schemeClr val="dk1"/>
-                </a:solidFill>
-                <a:latin typeface="Arial"/>
-                <a:ea typeface="Arial"/>
-                <a:cs typeface="Arial"/>
-                <a:sym typeface="Arial"/>
-              </a:rPr>
-              <a:t>.x3d</a:t>
-            </a:r>
-            <a:endParaRPr sz="1200" dirty="0"/>
-          </a:p>
-        </p:txBody>
-      </p:sp>
-      <p:pic>
-        <p:nvPicPr>
-          <p:cNvPr id="4" name="Picture 3" descr="A picture containing screen&#10;&#10;Description automatically generated">
-            <a:extLst>
-              <a:ext uri="{FF2B5EF4-FFF2-40B4-BE49-F238E27FC236}">
-                <a16:creationId xmlns:a16="http://schemas.microsoft.com/office/drawing/2014/main" id="{7F4B1189-28DC-2328-6546-D796DC12577A}"/>
-              </a:ext>
-            </a:extLst>
-          </p:cNvPr>
-          <p:cNvPicPr>
-            <a:picLocks noChangeAspect="1"/>
-          </p:cNvPicPr>
-          <p:nvPr/>
-        </p:nvPicPr>
-        <p:blipFill>
-          <a:blip r:embed="rId6"/>
-          <a:stretch>
-            <a:fillRect/>
-          </a:stretch>
-        </p:blipFill>
-        <p:spPr>
-          <a:xfrm>
-            <a:off x="3291303" y="3022164"/>
-            <a:ext cx="2561394" cy="1442663"/>
-          </a:xfrm>
-          <a:prstGeom prst="rect">
-            <a:avLst/>
-          </a:prstGeom>
-        </p:spPr>
-      </p:pic>
-    </p:spTree>
-  </p:cSld>
-  <p:clrMapOvr>
-    <a:masterClrMapping/>
-  </p:clrMapOvr>
 </p:sld>
 </file>
 

</xml_diff>